<commit_message>
added resume and stuff
</commit_message>
<xml_diff>
--- a/figures.pptx
+++ b/figures.pptx
@@ -5,7 +5,7 @@
     <p:sldMasterId id="2147483648" r:id="rId1"/>
   </p:sldMasterIdLst>
   <p:notesMasterIdLst>
-    <p:notesMasterId r:id="rId15"/>
+    <p:notesMasterId r:id="rId18"/>
   </p:notesMasterIdLst>
   <p:sldIdLst>
     <p:sldId id="256" r:id="rId2"/>
@@ -21,6 +21,9 @@
     <p:sldId id="266" r:id="rId12"/>
     <p:sldId id="267" r:id="rId13"/>
     <p:sldId id="268" r:id="rId14"/>
+    <p:sldId id="269" r:id="rId15"/>
+    <p:sldId id="270" r:id="rId16"/>
+    <p:sldId id="271" r:id="rId17"/>
   </p:sldIdLst>
   <p:sldSz cx="9144000" cy="6858000" type="screen4x3"/>
   <p:notesSz cx="6858000" cy="9144000"/>
@@ -204,7 +207,7 @@
           <a:p>
             <a:fld id="{C758F73B-546F-9342-9206-7D6C003DA71F}" type="datetimeFigureOut">
               <a:rPr lang="en-US" smtClean="0"/>
-              <a:t>1/11/15</a:t>
+              <a:t>6/10/15</a:t>
             </a:fld>
             <a:endParaRPr lang="en-US"/>
           </a:p>
@@ -737,7 +740,7 @@
           <a:p>
             <a:fld id="{BCBC1232-296F-3A42-9190-52DD26955895}" type="datetimeFigureOut">
               <a:rPr lang="en-US" smtClean="0"/>
-              <a:t>1/11/15</a:t>
+              <a:t>6/10/15</a:t>
             </a:fld>
             <a:endParaRPr lang="en-US"/>
           </a:p>
@@ -907,7 +910,7 @@
           <a:p>
             <a:fld id="{BCBC1232-296F-3A42-9190-52DD26955895}" type="datetimeFigureOut">
               <a:rPr lang="en-US" smtClean="0"/>
-              <a:t>1/11/15</a:t>
+              <a:t>6/10/15</a:t>
             </a:fld>
             <a:endParaRPr lang="en-US"/>
           </a:p>
@@ -1087,7 +1090,7 @@
           <a:p>
             <a:fld id="{BCBC1232-296F-3A42-9190-52DD26955895}" type="datetimeFigureOut">
               <a:rPr lang="en-US" smtClean="0"/>
-              <a:t>1/11/15</a:t>
+              <a:t>6/10/15</a:t>
             </a:fld>
             <a:endParaRPr lang="en-US"/>
           </a:p>
@@ -1257,7 +1260,7 @@
           <a:p>
             <a:fld id="{BCBC1232-296F-3A42-9190-52DD26955895}" type="datetimeFigureOut">
               <a:rPr lang="en-US" smtClean="0"/>
-              <a:t>1/11/15</a:t>
+              <a:t>6/10/15</a:t>
             </a:fld>
             <a:endParaRPr lang="en-US"/>
           </a:p>
@@ -1503,7 +1506,7 @@
           <a:p>
             <a:fld id="{BCBC1232-296F-3A42-9190-52DD26955895}" type="datetimeFigureOut">
               <a:rPr lang="en-US" smtClean="0"/>
-              <a:t>1/11/15</a:t>
+              <a:t>6/10/15</a:t>
             </a:fld>
             <a:endParaRPr lang="en-US"/>
           </a:p>
@@ -1791,7 +1794,7 @@
           <a:p>
             <a:fld id="{BCBC1232-296F-3A42-9190-52DD26955895}" type="datetimeFigureOut">
               <a:rPr lang="en-US" smtClean="0"/>
-              <a:t>1/11/15</a:t>
+              <a:t>6/10/15</a:t>
             </a:fld>
             <a:endParaRPr lang="en-US"/>
           </a:p>
@@ -2213,7 +2216,7 @@
           <a:p>
             <a:fld id="{BCBC1232-296F-3A42-9190-52DD26955895}" type="datetimeFigureOut">
               <a:rPr lang="en-US" smtClean="0"/>
-              <a:t>1/11/15</a:t>
+              <a:t>6/10/15</a:t>
             </a:fld>
             <a:endParaRPr lang="en-US"/>
           </a:p>
@@ -2331,7 +2334,7 @@
           <a:p>
             <a:fld id="{BCBC1232-296F-3A42-9190-52DD26955895}" type="datetimeFigureOut">
               <a:rPr lang="en-US" smtClean="0"/>
-              <a:t>1/11/15</a:t>
+              <a:t>6/10/15</a:t>
             </a:fld>
             <a:endParaRPr lang="en-US"/>
           </a:p>
@@ -2426,7 +2429,7 @@
           <a:p>
             <a:fld id="{BCBC1232-296F-3A42-9190-52DD26955895}" type="datetimeFigureOut">
               <a:rPr lang="en-US" smtClean="0"/>
-              <a:t>1/11/15</a:t>
+              <a:t>6/10/15</a:t>
             </a:fld>
             <a:endParaRPr lang="en-US"/>
           </a:p>
@@ -2703,7 +2706,7 @@
           <a:p>
             <a:fld id="{BCBC1232-296F-3A42-9190-52DD26955895}" type="datetimeFigureOut">
               <a:rPr lang="en-US" smtClean="0"/>
-              <a:t>1/11/15</a:t>
+              <a:t>6/10/15</a:t>
             </a:fld>
             <a:endParaRPr lang="en-US"/>
           </a:p>
@@ -2956,7 +2959,7 @@
           <a:p>
             <a:fld id="{BCBC1232-296F-3A42-9190-52DD26955895}" type="datetimeFigureOut">
               <a:rPr lang="en-US" smtClean="0"/>
-              <a:t>1/11/15</a:t>
+              <a:t>6/10/15</a:t>
             </a:fld>
             <a:endParaRPr lang="en-US"/>
           </a:p>
@@ -3169,7 +3172,7 @@
           <a:p>
             <a:fld id="{BCBC1232-296F-3A42-9190-52DD26955895}" type="datetimeFigureOut">
               <a:rPr lang="en-US" smtClean="0"/>
-              <a:t>1/11/15</a:t>
+              <a:t>6/10/15</a:t>
             </a:fld>
             <a:endParaRPr lang="en-US"/>
           </a:p>
@@ -3610,7 +3613,7 @@
           <a:graphicData uri="http://schemas.openxmlformats.org/presentationml/2006/ole">
             <mc:AlternateContent xmlns:mc="http://schemas.openxmlformats.org/markup-compatibility/2006">
               <mc:Choice xmlns:v="urn:schemas-microsoft-com:vml" Requires="v">
-                <p:oleObj spid="_x0000_s1105" name="Equation" r:id="rId3" imgW="139700" imgH="203200" progId="Equation.3">
+                <p:oleObj spid="_x0000_s1147" name="Equation" r:id="rId3" imgW="139700" imgH="203200" progId="Equation.3">
                   <p:embed/>
                 </p:oleObj>
               </mc:Choice>
@@ -3926,7 +3929,7 @@
           <a:graphicData uri="http://schemas.openxmlformats.org/presentationml/2006/ole">
             <mc:AlternateContent xmlns:mc="http://schemas.openxmlformats.org/markup-compatibility/2006">
               <mc:Choice xmlns:v="urn:schemas-microsoft-com:vml" Requires="v">
-                <p:oleObj spid="_x0000_s1106" name="Equation" r:id="rId5" imgW="152400" imgH="203200" progId="Equation.3">
+                <p:oleObj spid="_x0000_s1148" name="Equation" r:id="rId5" imgW="152400" imgH="203200" progId="Equation.3">
                   <p:embed/>
                 </p:oleObj>
               </mc:Choice>
@@ -3983,7 +3986,7 @@
           <a:graphicData uri="http://schemas.openxmlformats.org/presentationml/2006/ole">
             <mc:AlternateContent xmlns:mc="http://schemas.openxmlformats.org/markup-compatibility/2006">
               <mc:Choice xmlns:v="urn:schemas-microsoft-com:vml" Requires="v">
-                <p:oleObj spid="_x0000_s1107" name="Equation" r:id="rId7" imgW="177800" imgH="203200" progId="Equation.3">
+                <p:oleObj spid="_x0000_s1149" name="Equation" r:id="rId7" imgW="177800" imgH="203200" progId="Equation.3">
                   <p:embed/>
                 </p:oleObj>
               </mc:Choice>
@@ -4040,7 +4043,7 @@
           <a:graphicData uri="http://schemas.openxmlformats.org/presentationml/2006/ole">
             <mc:AlternateContent xmlns:mc="http://schemas.openxmlformats.org/markup-compatibility/2006">
               <mc:Choice xmlns:v="urn:schemas-microsoft-com:vml" Requires="v">
-                <p:oleObj spid="_x0000_s1108" name="Equation" r:id="rId9" imgW="177800" imgH="215900" progId="Equation.3">
+                <p:oleObj spid="_x0000_s1150" name="Equation" r:id="rId9" imgW="177800" imgH="215900" progId="Equation.3">
                   <p:embed/>
                 </p:oleObj>
               </mc:Choice>
@@ -4097,7 +4100,7 @@
           <a:graphicData uri="http://schemas.openxmlformats.org/presentationml/2006/ole">
             <mc:AlternateContent xmlns:mc="http://schemas.openxmlformats.org/markup-compatibility/2006">
               <mc:Choice xmlns:v="urn:schemas-microsoft-com:vml" Requires="v">
-                <p:oleObj spid="_x0000_s1109" name="Equation" r:id="rId11" imgW="127000" imgH="165100" progId="Equation.3">
+                <p:oleObj spid="_x0000_s1151" name="Equation" r:id="rId11" imgW="127000" imgH="165100" progId="Equation.3">
                   <p:embed/>
                 </p:oleObj>
               </mc:Choice>
@@ -4199,7 +4202,7 @@
           <a:graphicData uri="http://schemas.openxmlformats.org/presentationml/2006/ole">
             <mc:AlternateContent xmlns:mc="http://schemas.openxmlformats.org/markup-compatibility/2006">
               <mc:Choice xmlns:v="urn:schemas-microsoft-com:vml" Requires="v">
-                <p:oleObj spid="_x0000_s1110" name="Equation" r:id="rId13" imgW="177800" imgH="203200" progId="Equation.3">
+                <p:oleObj spid="_x0000_s1152" name="Equation" r:id="rId13" imgW="177800" imgH="203200" progId="Equation.3">
                   <p:embed/>
                 </p:oleObj>
               </mc:Choice>
@@ -4384,7 +4387,7 @@
           <a:graphicData uri="http://schemas.openxmlformats.org/presentationml/2006/ole">
             <mc:AlternateContent xmlns:mc="http://schemas.openxmlformats.org/markup-compatibility/2006">
               <mc:Choice xmlns:v="urn:schemas-microsoft-com:vml" Requires="v">
-                <p:oleObj spid="_x0000_s1111" name="Equation" r:id="rId15" imgW="203200" imgH="203200" progId="Equation.3">
+                <p:oleObj spid="_x0000_s1153" name="Equation" r:id="rId15" imgW="203200" imgH="203200" progId="Equation.3">
                   <p:embed/>
                 </p:oleObj>
               </mc:Choice>
@@ -4443,7 +4446,7 @@
           <a:graphicData uri="http://schemas.openxmlformats.org/presentationml/2006/ole">
             <mc:AlternateContent xmlns:mc="http://schemas.openxmlformats.org/markup-compatibility/2006">
               <mc:Choice xmlns:v="urn:schemas-microsoft-com:vml" Requires="v">
-                <p:oleObj spid="_x0000_s1112" name="Equation" r:id="rId17" imgW="203200" imgH="215900" progId="Equation.3">
+                <p:oleObj spid="_x0000_s1154" name="Equation" r:id="rId17" imgW="203200" imgH="215900" progId="Equation.3">
                   <p:embed/>
                 </p:oleObj>
               </mc:Choice>
@@ -8184,7 +8187,7 @@
           <a:graphicData uri="http://schemas.openxmlformats.org/presentationml/2006/ole">
             <mc:AlternateContent xmlns:mc="http://schemas.openxmlformats.org/markup-compatibility/2006">
               <mc:Choice xmlns:v="urn:schemas-microsoft-com:vml" Requires="v">
-                <p:oleObj spid="_x0000_s10250" name="Equation" r:id="rId3" imgW="177800" imgH="203200" progId="Equation.3">
+                <p:oleObj spid="_x0000_s10297" name="Equation" r:id="rId3" imgW="177800" imgH="203200" progId="Equation.3">
                   <p:embed/>
                 </p:oleObj>
               </mc:Choice>
@@ -8241,7 +8244,7 @@
           <a:graphicData uri="http://schemas.openxmlformats.org/presentationml/2006/ole">
             <mc:AlternateContent xmlns:mc="http://schemas.openxmlformats.org/markup-compatibility/2006">
               <mc:Choice xmlns:v="urn:schemas-microsoft-com:vml" Requires="v">
-                <p:oleObj spid="_x0000_s10251" name="Equation" r:id="rId5" imgW="203200" imgH="203200" progId="Equation.3">
+                <p:oleObj spid="_x0000_s10298" name="Equation" r:id="rId5" imgW="203200" imgH="203200" progId="Equation.3">
                   <p:embed/>
                 </p:oleObj>
               </mc:Choice>
@@ -8298,7 +8301,7 @@
           <a:graphicData uri="http://schemas.openxmlformats.org/presentationml/2006/ole">
             <mc:AlternateContent xmlns:mc="http://schemas.openxmlformats.org/markup-compatibility/2006">
               <mc:Choice xmlns:v="urn:schemas-microsoft-com:vml" Requires="v">
-                <p:oleObj spid="_x0000_s10252" name="Equation" r:id="rId7" imgW="190500" imgH="215900" progId="Equation.3">
+                <p:oleObj spid="_x0000_s10299" name="Equation" r:id="rId7" imgW="190500" imgH="215900" progId="Equation.3">
                   <p:embed/>
                 </p:oleObj>
               </mc:Choice>
@@ -8355,7 +8358,7 @@
           <a:graphicData uri="http://schemas.openxmlformats.org/presentationml/2006/ole">
             <mc:AlternateContent xmlns:mc="http://schemas.openxmlformats.org/markup-compatibility/2006">
               <mc:Choice xmlns:v="urn:schemas-microsoft-com:vml" Requires="v">
-                <p:oleObj spid="_x0000_s10253" name="Equation" r:id="rId9" imgW="177800" imgH="203200" progId="Equation.3">
+                <p:oleObj spid="_x0000_s10300" name="Equation" r:id="rId9" imgW="177800" imgH="203200" progId="Equation.3">
                   <p:embed/>
                 </p:oleObj>
               </mc:Choice>
@@ -8412,7 +8415,7 @@
           <a:graphicData uri="http://schemas.openxmlformats.org/presentationml/2006/ole">
             <mc:AlternateContent xmlns:mc="http://schemas.openxmlformats.org/markup-compatibility/2006">
               <mc:Choice xmlns:v="urn:schemas-microsoft-com:vml" Requires="v">
-                <p:oleObj spid="_x0000_s10254" name="Equation" r:id="rId10" imgW="203200" imgH="203200" progId="Equation.3">
+                <p:oleObj spid="_x0000_s10301" name="Equation" r:id="rId10" imgW="203200" imgH="203200" progId="Equation.3">
                   <p:embed/>
                 </p:oleObj>
               </mc:Choice>
@@ -8469,7 +8472,7 @@
           <a:graphicData uri="http://schemas.openxmlformats.org/presentationml/2006/ole">
             <mc:AlternateContent xmlns:mc="http://schemas.openxmlformats.org/markup-compatibility/2006">
               <mc:Choice xmlns:v="urn:schemas-microsoft-com:vml" Requires="v">
-                <p:oleObj spid="_x0000_s10255" name="Equation" r:id="rId11" imgW="190500" imgH="215900" progId="Equation.3">
+                <p:oleObj spid="_x0000_s10302" name="Equation" r:id="rId11" imgW="190500" imgH="215900" progId="Equation.3">
                   <p:embed/>
                 </p:oleObj>
               </mc:Choice>
@@ -8526,7 +8529,7 @@
           <a:graphicData uri="http://schemas.openxmlformats.org/presentationml/2006/ole">
             <mc:AlternateContent xmlns:mc="http://schemas.openxmlformats.org/markup-compatibility/2006">
               <mc:Choice xmlns:v="urn:schemas-microsoft-com:vml" Requires="v">
-                <p:oleObj spid="_x0000_s10256" name="Equation" r:id="rId12" imgW="177800" imgH="203200" progId="Equation.3">
+                <p:oleObj spid="_x0000_s10303" name="Equation" r:id="rId12" imgW="177800" imgH="203200" progId="Equation.3">
                   <p:embed/>
                 </p:oleObj>
               </mc:Choice>
@@ -8583,7 +8586,7 @@
           <a:graphicData uri="http://schemas.openxmlformats.org/presentationml/2006/ole">
             <mc:AlternateContent xmlns:mc="http://schemas.openxmlformats.org/markup-compatibility/2006">
               <mc:Choice xmlns:v="urn:schemas-microsoft-com:vml" Requires="v">
-                <p:oleObj spid="_x0000_s10257" name="Equation" r:id="rId13" imgW="203200" imgH="203200" progId="Equation.3">
+                <p:oleObj spid="_x0000_s10304" name="Equation" r:id="rId13" imgW="203200" imgH="203200" progId="Equation.3">
                   <p:embed/>
                 </p:oleObj>
               </mc:Choice>
@@ -8640,7 +8643,7 @@
           <a:graphicData uri="http://schemas.openxmlformats.org/presentationml/2006/ole">
             <mc:AlternateContent xmlns:mc="http://schemas.openxmlformats.org/markup-compatibility/2006">
               <mc:Choice xmlns:v="urn:schemas-microsoft-com:vml" Requires="v">
-                <p:oleObj spid="_x0000_s10258" name="Equation" r:id="rId14" imgW="190500" imgH="215900" progId="Equation.3">
+                <p:oleObj spid="_x0000_s10305" name="Equation" r:id="rId14" imgW="190500" imgH="215900" progId="Equation.3">
                   <p:embed/>
                 </p:oleObj>
               </mc:Choice>
@@ -10356,10 +10359,6 @@
               </a:rPr>
               <a:t>4.2</a:t>
             </a:r>
-            <a:endParaRPr lang="en-US" dirty="0">
-              <a:latin typeface="Cambria"/>
-              <a:cs typeface="Cambria"/>
-            </a:endParaRPr>
           </a:p>
         </p:txBody>
       </p:sp>
@@ -11212,10 +11211,6 @@
               </a:rPr>
               <a:t>0</a:t>
             </a:r>
-            <a:endParaRPr lang="en-US" dirty="0">
-              <a:latin typeface="Cambria"/>
-              <a:cs typeface="Cambria"/>
-            </a:endParaRPr>
           </a:p>
         </p:txBody>
       </p:sp>
@@ -11686,6 +11681,2729 @@
               </a:rPr>
               <a:t>4.2</a:t>
             </a:r>
+          </a:p>
+        </p:txBody>
+      </p:sp>
+    </p:spTree>
+    <p:extLst>
+      <p:ext uri="{BB962C8B-B14F-4D97-AF65-F5344CB8AC3E}">
+        <p14:creationId xmlns:p14="http://schemas.microsoft.com/office/powerpoint/2010/main" val="4237863019"/>
+      </p:ext>
+    </p:extLst>
+  </p:cSld>
+  <p:clrMapOvr>
+    <a:masterClrMapping/>
+  </p:clrMapOvr>
+</p:sld>
+</file>
+
+<file path=ppt/slides/slide14.xml><?xml version="1.0" encoding="utf-8"?>
+<p:sld xmlns:a="http://schemas.openxmlformats.org/drawingml/2006/main" xmlns:r="http://schemas.openxmlformats.org/officeDocument/2006/relationships" xmlns:p="http://schemas.openxmlformats.org/presentationml/2006/main">
+  <p:cSld>
+    <p:spTree>
+      <p:nvGrpSpPr>
+        <p:cNvPr id="1" name=""/>
+        <p:cNvGrpSpPr/>
+        <p:nvPr/>
+      </p:nvGrpSpPr>
+      <p:grpSpPr>
+        <a:xfrm>
+          <a:off x="0" y="0"/>
+          <a:ext cx="0" cy="0"/>
+          <a:chOff x="0" y="0"/>
+          <a:chExt cx="0" cy="0"/>
+        </a:xfrm>
+      </p:grpSpPr>
+      <p:sp>
+        <p:nvSpPr>
+          <p:cNvPr id="4" name="Oval 3"/>
+          <p:cNvSpPr/>
+          <p:nvPr/>
+        </p:nvSpPr>
+        <p:spPr>
+          <a:xfrm>
+            <a:off x="4289183" y="2155280"/>
+            <a:ext cx="903111" cy="903111"/>
+          </a:xfrm>
+          <a:prstGeom prst="ellipse">
+            <a:avLst/>
+          </a:prstGeom>
+          <a:noFill/>
+        </p:spPr>
+        <p:style>
+          <a:lnRef idx="2">
+            <a:schemeClr val="dk1"/>
+          </a:lnRef>
+          <a:fillRef idx="1">
+            <a:schemeClr val="lt1"/>
+          </a:fillRef>
+          <a:effectRef idx="0">
+            <a:schemeClr val="dk1"/>
+          </a:effectRef>
+          <a:fontRef idx="minor">
+            <a:schemeClr val="dk1"/>
+          </a:fontRef>
+        </p:style>
+        <p:txBody>
+          <a:bodyPr rtlCol="0" anchor="ctr"/>
+          <a:lstStyle/>
+          <a:p>
+            <a:pPr algn="ctr"/>
+            <a:endParaRPr lang="en-US"/>
+          </a:p>
+        </p:txBody>
+      </p:sp>
+      <p:cxnSp>
+        <p:nvCxnSpPr>
+          <p:cNvPr id="5" name="Straight Arrow Connector 4"/>
+          <p:cNvCxnSpPr>
+            <a:endCxn id="4" idx="3"/>
+          </p:cNvCxnSpPr>
+          <p:nvPr/>
+        </p:nvCxnSpPr>
+        <p:spPr>
+          <a:xfrm flipV="1">
+            <a:off x="3905536" y="2926133"/>
+            <a:ext cx="515905" cy="841531"/>
+          </a:xfrm>
+          <a:prstGeom prst="straightConnector1">
+            <a:avLst/>
+          </a:prstGeom>
+          <a:ln>
+            <a:tailEnd type="arrow"/>
+          </a:ln>
+        </p:spPr>
+        <p:style>
+          <a:lnRef idx="1">
+            <a:schemeClr val="dk1"/>
+          </a:lnRef>
+          <a:fillRef idx="0">
+            <a:schemeClr val="dk1"/>
+          </a:fillRef>
+          <a:effectRef idx="0">
+            <a:schemeClr val="dk1"/>
+          </a:effectRef>
+          <a:fontRef idx="minor">
+            <a:schemeClr val="tx1"/>
+          </a:fontRef>
+        </p:style>
+      </p:cxnSp>
+      <p:cxnSp>
+        <p:nvCxnSpPr>
+          <p:cNvPr id="7" name="Straight Arrow Connector 6"/>
+          <p:cNvCxnSpPr>
+            <a:endCxn id="4" idx="5"/>
+          </p:cNvCxnSpPr>
+          <p:nvPr/>
+        </p:nvCxnSpPr>
+        <p:spPr>
+          <a:xfrm flipH="1" flipV="1">
+            <a:off x="5060036" y="2926133"/>
+            <a:ext cx="512064" cy="842592"/>
+          </a:xfrm>
+          <a:prstGeom prst="straightConnector1">
+            <a:avLst/>
+          </a:prstGeom>
+          <a:ln>
+            <a:tailEnd type="arrow"/>
+          </a:ln>
+        </p:spPr>
+        <p:style>
+          <a:lnRef idx="1">
+            <a:schemeClr val="dk1"/>
+          </a:lnRef>
+          <a:fillRef idx="0">
+            <a:schemeClr val="dk1"/>
+          </a:fillRef>
+          <a:effectRef idx="0">
+            <a:schemeClr val="dk1"/>
+          </a:effectRef>
+          <a:fontRef idx="minor">
+            <a:schemeClr val="tx1"/>
+          </a:fontRef>
+        </p:style>
+      </p:cxnSp>
+      <p:cxnSp>
+        <p:nvCxnSpPr>
+          <p:cNvPr id="15" name="Straight Arrow Connector 14"/>
+          <p:cNvCxnSpPr>
+            <a:stCxn id="4" idx="0"/>
+          </p:cNvCxnSpPr>
+          <p:nvPr/>
+        </p:nvCxnSpPr>
+        <p:spPr>
+          <a:xfrm flipV="1">
+            <a:off x="4740739" y="1563857"/>
+            <a:ext cx="0" cy="591423"/>
+          </a:xfrm>
+          <a:prstGeom prst="straightConnector1">
+            <a:avLst/>
+          </a:prstGeom>
+          <a:ln>
+            <a:tailEnd type="arrow"/>
+          </a:ln>
+        </p:spPr>
+        <p:style>
+          <a:lnRef idx="1">
+            <a:schemeClr val="dk1"/>
+          </a:lnRef>
+          <a:fillRef idx="0">
+            <a:schemeClr val="dk1"/>
+          </a:fillRef>
+          <a:effectRef idx="0">
+            <a:schemeClr val="dk1"/>
+          </a:effectRef>
+          <a:fontRef idx="minor">
+            <a:schemeClr val="tx1"/>
+          </a:fontRef>
+        </p:style>
+      </p:cxnSp>
+      <p:graphicFrame>
+        <p:nvGraphicFramePr>
+          <p:cNvPr id="18" name="Object 17"/>
+          <p:cNvGraphicFramePr>
+            <a:graphicFrameLocks noChangeAspect="1"/>
+          </p:cNvGraphicFramePr>
+          <p:nvPr>
+            <p:extLst>
+              <p:ext uri="{D42A27DB-BD31-4B8C-83A1-F6EECF244321}">
+                <p14:modId xmlns:p14="http://schemas.microsoft.com/office/powerpoint/2010/main" val="3467360461"/>
+              </p:ext>
+            </p:extLst>
+          </p:nvPr>
+        </p:nvGraphicFramePr>
+        <p:xfrm>
+          <a:off x="4613739" y="1199618"/>
+          <a:ext cx="254000" cy="330200"/>
+        </p:xfrm>
+        <a:graphic>
+          <a:graphicData uri="http://schemas.openxmlformats.org/presentationml/2006/ole">
+            <mc:AlternateContent xmlns:mc="http://schemas.openxmlformats.org/markup-compatibility/2006">
+              <mc:Choice xmlns:v="urn:schemas-microsoft-com:vml" Requires="v">
+                <p:oleObj spid="_x0000_s11326" name="Equation" r:id="rId3" imgW="127000" imgH="165100" progId="Equation.3">
+                  <p:embed/>
+                </p:oleObj>
+              </mc:Choice>
+              <mc:Fallback>
+                <p:oleObj name="Equation" r:id="rId3" imgW="127000" imgH="165100" progId="Equation.3">
+                  <p:embed/>
+                  <p:pic>
+                    <p:nvPicPr>
+                      <p:cNvPr id="0" name=""/>
+                      <p:cNvPicPr/>
+                      <p:nvPr/>
+                    </p:nvPicPr>
+                    <p:blipFill>
+                      <a:blip r:embed="rId4"/>
+                      <a:stretch>
+                        <a:fillRect/>
+                      </a:stretch>
+                    </p:blipFill>
+                    <p:spPr>
+                      <a:xfrm>
+                        <a:off x="4613739" y="1199618"/>
+                        <a:ext cx="254000" cy="330200"/>
+                      </a:xfrm>
+                      <a:prstGeom prst="rect">
+                        <a:avLst/>
+                      </a:prstGeom>
+                    </p:spPr>
+                  </p:pic>
+                </p:oleObj>
+              </mc:Fallback>
+            </mc:AlternateContent>
+          </a:graphicData>
+        </a:graphic>
+      </p:graphicFrame>
+      <p:graphicFrame>
+        <p:nvGraphicFramePr>
+          <p:cNvPr id="19" name="Object 18"/>
+          <p:cNvGraphicFramePr>
+            <a:graphicFrameLocks noChangeAspect="1"/>
+          </p:cNvGraphicFramePr>
+          <p:nvPr>
+            <p:extLst>
+              <p:ext uri="{D42A27DB-BD31-4B8C-83A1-F6EECF244321}">
+                <p14:modId xmlns:p14="http://schemas.microsoft.com/office/powerpoint/2010/main" val="2567450174"/>
+              </p:ext>
+            </p:extLst>
+          </p:nvPr>
+        </p:nvGraphicFramePr>
+        <p:xfrm>
+          <a:off x="3568048" y="3767664"/>
+          <a:ext cx="304800" cy="406400"/>
+        </p:xfrm>
+        <a:graphic>
+          <a:graphicData uri="http://schemas.openxmlformats.org/presentationml/2006/ole">
+            <mc:AlternateContent xmlns:mc="http://schemas.openxmlformats.org/markup-compatibility/2006">
+              <mc:Choice xmlns:v="urn:schemas-microsoft-com:vml" Requires="v">
+                <p:oleObj spid="_x0000_s11327" name="Equation" r:id="rId5" imgW="152400" imgH="203200" progId="Equation.3">
+                  <p:embed/>
+                </p:oleObj>
+              </mc:Choice>
+              <mc:Fallback>
+                <p:oleObj name="Equation" r:id="rId5" imgW="152400" imgH="203200" progId="Equation.3">
+                  <p:embed/>
+                  <p:pic>
+                    <p:nvPicPr>
+                      <p:cNvPr id="0" name=""/>
+                      <p:cNvPicPr/>
+                      <p:nvPr/>
+                    </p:nvPicPr>
+                    <p:blipFill>
+                      <a:blip r:embed="rId6"/>
+                      <a:stretch>
+                        <a:fillRect/>
+                      </a:stretch>
+                    </p:blipFill>
+                    <p:spPr>
+                      <a:xfrm>
+                        <a:off x="3568048" y="3767664"/>
+                        <a:ext cx="304800" cy="406400"/>
+                      </a:xfrm>
+                      <a:prstGeom prst="rect">
+                        <a:avLst/>
+                      </a:prstGeom>
+                    </p:spPr>
+                  </p:pic>
+                </p:oleObj>
+              </mc:Fallback>
+            </mc:AlternateContent>
+          </a:graphicData>
+        </a:graphic>
+      </p:graphicFrame>
+      <p:graphicFrame>
+        <p:nvGraphicFramePr>
+          <p:cNvPr id="21" name="Object 20"/>
+          <p:cNvGraphicFramePr>
+            <a:graphicFrameLocks noChangeAspect="1"/>
+          </p:cNvGraphicFramePr>
+          <p:nvPr>
+            <p:extLst>
+              <p:ext uri="{D42A27DB-BD31-4B8C-83A1-F6EECF244321}">
+                <p14:modId xmlns:p14="http://schemas.microsoft.com/office/powerpoint/2010/main" val="1584283716"/>
+              </p:ext>
+            </p:extLst>
+          </p:nvPr>
+        </p:nvGraphicFramePr>
+        <p:xfrm>
+          <a:off x="5595588" y="3768725"/>
+          <a:ext cx="355600" cy="406400"/>
+        </p:xfrm>
+        <a:graphic>
+          <a:graphicData uri="http://schemas.openxmlformats.org/presentationml/2006/ole">
+            <mc:AlternateContent xmlns:mc="http://schemas.openxmlformats.org/markup-compatibility/2006">
+              <mc:Choice xmlns:v="urn:schemas-microsoft-com:vml" Requires="v">
+                <p:oleObj spid="_x0000_s11328" name="Equation" r:id="rId7" imgW="177800" imgH="203200" progId="Equation.3">
+                  <p:embed/>
+                </p:oleObj>
+              </mc:Choice>
+              <mc:Fallback>
+                <p:oleObj name="Equation" r:id="rId7" imgW="177800" imgH="203200" progId="Equation.3">
+                  <p:embed/>
+                  <p:pic>
+                    <p:nvPicPr>
+                      <p:cNvPr id="0" name=""/>
+                      <p:cNvPicPr/>
+                      <p:nvPr/>
+                    </p:nvPicPr>
+                    <p:blipFill>
+                      <a:blip r:embed="rId8"/>
+                      <a:stretch>
+                        <a:fillRect/>
+                      </a:stretch>
+                    </p:blipFill>
+                    <p:spPr>
+                      <a:xfrm>
+                        <a:off x="5595588" y="3768725"/>
+                        <a:ext cx="355600" cy="406400"/>
+                      </a:xfrm>
+                      <a:prstGeom prst="rect">
+                        <a:avLst/>
+                      </a:prstGeom>
+                    </p:spPr>
+                  </p:pic>
+                </p:oleObj>
+              </mc:Fallback>
+            </mc:AlternateContent>
+          </a:graphicData>
+        </a:graphic>
+      </p:graphicFrame>
+      <p:graphicFrame>
+        <p:nvGraphicFramePr>
+          <p:cNvPr id="22" name="Object 21"/>
+          <p:cNvGraphicFramePr>
+            <a:graphicFrameLocks noChangeAspect="1"/>
+          </p:cNvGraphicFramePr>
+          <p:nvPr>
+            <p:extLst>
+              <p:ext uri="{D42A27DB-BD31-4B8C-83A1-F6EECF244321}">
+                <p14:modId xmlns:p14="http://schemas.microsoft.com/office/powerpoint/2010/main" val="1806585048"/>
+              </p:ext>
+            </p:extLst>
+          </p:nvPr>
+        </p:nvGraphicFramePr>
+        <p:xfrm>
+          <a:off x="3364198" y="4187825"/>
+          <a:ext cx="711200" cy="406400"/>
+        </p:xfrm>
+        <a:graphic>
+          <a:graphicData uri="http://schemas.openxmlformats.org/presentationml/2006/ole">
+            <mc:AlternateContent xmlns:mc="http://schemas.openxmlformats.org/markup-compatibility/2006">
+              <mc:Choice xmlns:v="urn:schemas-microsoft-com:vml" Requires="v">
+                <p:oleObj spid="_x0000_s11329" name="Equation" r:id="rId9" imgW="355600" imgH="203200" progId="Equation.3">
+                  <p:embed/>
+                </p:oleObj>
+              </mc:Choice>
+              <mc:Fallback>
+                <p:oleObj name="Equation" r:id="rId9" imgW="355600" imgH="203200" progId="Equation.3">
+                  <p:embed/>
+                  <p:pic>
+                    <p:nvPicPr>
+                      <p:cNvPr id="0" name=""/>
+                      <p:cNvPicPr/>
+                      <p:nvPr/>
+                    </p:nvPicPr>
+                    <p:blipFill>
+                      <a:blip r:embed="rId10"/>
+                      <a:stretch>
+                        <a:fillRect/>
+                      </a:stretch>
+                    </p:blipFill>
+                    <p:spPr>
+                      <a:xfrm>
+                        <a:off x="3364198" y="4187825"/>
+                        <a:ext cx="711200" cy="406400"/>
+                      </a:xfrm>
+                      <a:prstGeom prst="rect">
+                        <a:avLst/>
+                      </a:prstGeom>
+                    </p:spPr>
+                  </p:pic>
+                </p:oleObj>
+              </mc:Fallback>
+            </mc:AlternateContent>
+          </a:graphicData>
+        </a:graphic>
+      </p:graphicFrame>
+      <p:graphicFrame>
+        <p:nvGraphicFramePr>
+          <p:cNvPr id="24" name="Object 23"/>
+          <p:cNvGraphicFramePr>
+            <a:graphicFrameLocks noChangeAspect="1"/>
+          </p:cNvGraphicFramePr>
+          <p:nvPr>
+            <p:extLst>
+              <p:ext uri="{D42A27DB-BD31-4B8C-83A1-F6EECF244321}">
+                <p14:modId xmlns:p14="http://schemas.microsoft.com/office/powerpoint/2010/main" val="1983975830"/>
+              </p:ext>
+            </p:extLst>
+          </p:nvPr>
+        </p:nvGraphicFramePr>
+        <p:xfrm>
+          <a:off x="5477478" y="4187825"/>
+          <a:ext cx="762000" cy="406400"/>
+        </p:xfrm>
+        <a:graphic>
+          <a:graphicData uri="http://schemas.openxmlformats.org/presentationml/2006/ole">
+            <mc:AlternateContent xmlns:mc="http://schemas.openxmlformats.org/markup-compatibility/2006">
+              <mc:Choice xmlns:v="urn:schemas-microsoft-com:vml" Requires="v">
+                <p:oleObj spid="_x0000_s11330" name="Equation" r:id="rId11" imgW="381000" imgH="203200" progId="Equation.3">
+                  <p:embed/>
+                </p:oleObj>
+              </mc:Choice>
+              <mc:Fallback>
+                <p:oleObj name="Equation" r:id="rId11" imgW="381000" imgH="203200" progId="Equation.3">
+                  <p:embed/>
+                  <p:pic>
+                    <p:nvPicPr>
+                      <p:cNvPr id="0" name=""/>
+                      <p:cNvPicPr/>
+                      <p:nvPr/>
+                    </p:nvPicPr>
+                    <p:blipFill>
+                      <a:blip r:embed="rId12"/>
+                      <a:stretch>
+                        <a:fillRect/>
+                      </a:stretch>
+                    </p:blipFill>
+                    <p:spPr>
+                      <a:xfrm>
+                        <a:off x="5477478" y="4187825"/>
+                        <a:ext cx="762000" cy="406400"/>
+                      </a:xfrm>
+                      <a:prstGeom prst="rect">
+                        <a:avLst/>
+                      </a:prstGeom>
+                    </p:spPr>
+                  </p:pic>
+                </p:oleObj>
+              </mc:Fallback>
+            </mc:AlternateContent>
+          </a:graphicData>
+        </a:graphic>
+      </p:graphicFrame>
+      <p:graphicFrame>
+        <p:nvGraphicFramePr>
+          <p:cNvPr id="25" name="Object 24"/>
+          <p:cNvGraphicFramePr>
+            <a:graphicFrameLocks noChangeAspect="1"/>
+          </p:cNvGraphicFramePr>
+          <p:nvPr>
+            <p:extLst>
+              <p:ext uri="{D42A27DB-BD31-4B8C-83A1-F6EECF244321}">
+                <p14:modId xmlns:p14="http://schemas.microsoft.com/office/powerpoint/2010/main" val="1734585630"/>
+              </p:ext>
+            </p:extLst>
+          </p:nvPr>
+        </p:nvGraphicFramePr>
+        <p:xfrm>
+          <a:off x="3900456" y="3082608"/>
+          <a:ext cx="228600" cy="330200"/>
+        </p:xfrm>
+        <a:graphic>
+          <a:graphicData uri="http://schemas.openxmlformats.org/presentationml/2006/ole">
+            <mc:AlternateContent xmlns:mc="http://schemas.openxmlformats.org/markup-compatibility/2006">
+              <mc:Choice xmlns:v="urn:schemas-microsoft-com:vml" Requires="v">
+                <p:oleObj spid="_x0000_s11331" name="Equation" r:id="rId13" imgW="114300" imgH="165100" progId="Equation.3">
+                  <p:embed/>
+                </p:oleObj>
+              </mc:Choice>
+              <mc:Fallback>
+                <p:oleObj name="Equation" r:id="rId13" imgW="114300" imgH="165100" progId="Equation.3">
+                  <p:embed/>
+                  <p:pic>
+                    <p:nvPicPr>
+                      <p:cNvPr id="0" name=""/>
+                      <p:cNvPicPr/>
+                      <p:nvPr/>
+                    </p:nvPicPr>
+                    <p:blipFill>
+                      <a:blip r:embed="rId14"/>
+                      <a:stretch>
+                        <a:fillRect/>
+                      </a:stretch>
+                    </p:blipFill>
+                    <p:spPr>
+                      <a:xfrm>
+                        <a:off x="3900456" y="3082608"/>
+                        <a:ext cx="228600" cy="330200"/>
+                      </a:xfrm>
+                      <a:prstGeom prst="rect">
+                        <a:avLst/>
+                      </a:prstGeom>
+                    </p:spPr>
+                  </p:pic>
+                </p:oleObj>
+              </mc:Fallback>
+            </mc:AlternateContent>
+          </a:graphicData>
+        </a:graphic>
+      </p:graphicFrame>
+      <p:graphicFrame>
+        <p:nvGraphicFramePr>
+          <p:cNvPr id="26" name="Object 25"/>
+          <p:cNvGraphicFramePr>
+            <a:graphicFrameLocks noChangeAspect="1"/>
+          </p:cNvGraphicFramePr>
+          <p:nvPr>
+            <p:extLst>
+              <p:ext uri="{D42A27DB-BD31-4B8C-83A1-F6EECF244321}">
+                <p14:modId xmlns:p14="http://schemas.microsoft.com/office/powerpoint/2010/main" val="2875952601"/>
+              </p:ext>
+            </p:extLst>
+          </p:nvPr>
+        </p:nvGraphicFramePr>
+        <p:xfrm>
+          <a:off x="5341271" y="3085148"/>
+          <a:ext cx="254000" cy="304800"/>
+        </p:xfrm>
+        <a:graphic>
+          <a:graphicData uri="http://schemas.openxmlformats.org/presentationml/2006/ole">
+            <mc:AlternateContent xmlns:mc="http://schemas.openxmlformats.org/markup-compatibility/2006">
+              <mc:Choice xmlns:v="urn:schemas-microsoft-com:vml" Requires="v">
+                <p:oleObj spid="_x0000_s11332" name="Equation" r:id="rId15" imgW="127000" imgH="152400" progId="Equation.3">
+                  <p:embed/>
+                </p:oleObj>
+              </mc:Choice>
+              <mc:Fallback>
+                <p:oleObj name="Equation" r:id="rId15" imgW="127000" imgH="152400" progId="Equation.3">
+                  <p:embed/>
+                  <p:pic>
+                    <p:nvPicPr>
+                      <p:cNvPr id="0" name=""/>
+                      <p:cNvPicPr/>
+                      <p:nvPr/>
+                    </p:nvPicPr>
+                    <p:blipFill>
+                      <a:blip r:embed="rId16"/>
+                      <a:stretch>
+                        <a:fillRect/>
+                      </a:stretch>
+                    </p:blipFill>
+                    <p:spPr>
+                      <a:xfrm>
+                        <a:off x="5341271" y="3085148"/>
+                        <a:ext cx="254000" cy="304800"/>
+                      </a:xfrm>
+                      <a:prstGeom prst="rect">
+                        <a:avLst/>
+                      </a:prstGeom>
+                    </p:spPr>
+                  </p:pic>
+                </p:oleObj>
+              </mc:Fallback>
+            </mc:AlternateContent>
+          </a:graphicData>
+        </a:graphic>
+      </p:graphicFrame>
+      <p:graphicFrame>
+        <p:nvGraphicFramePr>
+          <p:cNvPr id="32" name="Object 31"/>
+          <p:cNvGraphicFramePr>
+            <a:graphicFrameLocks noChangeAspect="1"/>
+          </p:cNvGraphicFramePr>
+          <p:nvPr>
+            <p:extLst>
+              <p:ext uri="{D42A27DB-BD31-4B8C-83A1-F6EECF244321}">
+                <p14:modId xmlns:p14="http://schemas.microsoft.com/office/powerpoint/2010/main" val="3669536599"/>
+              </p:ext>
+            </p:extLst>
+          </p:nvPr>
+        </p:nvGraphicFramePr>
+        <p:xfrm>
+          <a:off x="6008973" y="3346450"/>
+          <a:ext cx="114300" cy="165100"/>
+        </p:xfrm>
+        <a:graphic>
+          <a:graphicData uri="http://schemas.openxmlformats.org/presentationml/2006/ole">
+            <mc:AlternateContent xmlns:mc="http://schemas.openxmlformats.org/markup-compatibility/2006">
+              <mc:Choice xmlns:v="urn:schemas-microsoft-com:vml" Requires="v">
+                <p:oleObj spid="_x0000_s11333" name="Equation" r:id="rId17" imgW="114300" imgH="165100" progId="Equation.3">
+                  <p:embed/>
+                </p:oleObj>
+              </mc:Choice>
+              <mc:Fallback>
+                <p:oleObj name="Equation" r:id="rId17" imgW="114300" imgH="165100" progId="Equation.3">
+                  <p:embed/>
+                  <p:pic>
+                    <p:nvPicPr>
+                      <p:cNvPr id="0" name=""/>
+                      <p:cNvPicPr/>
+                      <p:nvPr/>
+                    </p:nvPicPr>
+                    <p:blipFill>
+                      <a:blip r:embed="rId18"/>
+                      <a:stretch>
+                        <a:fillRect/>
+                      </a:stretch>
+                    </p:blipFill>
+                    <p:spPr>
+                      <a:xfrm>
+                        <a:off x="6008973" y="3346450"/>
+                        <a:ext cx="114300" cy="165100"/>
+                      </a:xfrm>
+                      <a:prstGeom prst="rect">
+                        <a:avLst/>
+                      </a:prstGeom>
+                    </p:spPr>
+                  </p:pic>
+                </p:oleObj>
+              </mc:Fallback>
+            </mc:AlternateContent>
+          </a:graphicData>
+        </a:graphic>
+      </p:graphicFrame>
+      <p:cxnSp>
+        <p:nvCxnSpPr>
+          <p:cNvPr id="28" name="Straight Arrow Connector 27"/>
+          <p:cNvCxnSpPr>
+            <a:endCxn id="4" idx="2"/>
+          </p:cNvCxnSpPr>
+          <p:nvPr/>
+        </p:nvCxnSpPr>
+        <p:spPr>
+          <a:xfrm>
+            <a:off x="3364516" y="2606836"/>
+            <a:ext cx="924667" cy="0"/>
+          </a:xfrm>
+          <a:prstGeom prst="straightConnector1">
+            <a:avLst/>
+          </a:prstGeom>
+          <a:ln>
+            <a:tailEnd type="arrow"/>
+          </a:ln>
+        </p:spPr>
+        <p:style>
+          <a:lnRef idx="1">
+            <a:schemeClr val="dk1"/>
+          </a:lnRef>
+          <a:fillRef idx="0">
+            <a:schemeClr val="dk1"/>
+          </a:fillRef>
+          <a:effectRef idx="0">
+            <a:schemeClr val="dk1"/>
+          </a:effectRef>
+          <a:fontRef idx="minor">
+            <a:schemeClr val="tx1"/>
+          </a:fontRef>
+        </p:style>
+      </p:cxnSp>
+      <p:graphicFrame>
+        <p:nvGraphicFramePr>
+          <p:cNvPr id="29" name="Object 28"/>
+          <p:cNvGraphicFramePr>
+            <a:graphicFrameLocks noChangeAspect="1"/>
+          </p:cNvGraphicFramePr>
+          <p:nvPr>
+            <p:extLst>
+              <p:ext uri="{D42A27DB-BD31-4B8C-83A1-F6EECF244321}">
+                <p14:modId xmlns:p14="http://schemas.microsoft.com/office/powerpoint/2010/main" val="3700398615"/>
+              </p:ext>
+            </p:extLst>
+          </p:nvPr>
+        </p:nvGraphicFramePr>
+        <p:xfrm>
+          <a:off x="2805716" y="2454436"/>
+          <a:ext cx="558800" cy="304800"/>
+        </p:xfrm>
+        <a:graphic>
+          <a:graphicData uri="http://schemas.openxmlformats.org/presentationml/2006/ole">
+            <mc:AlternateContent xmlns:mc="http://schemas.openxmlformats.org/markup-compatibility/2006">
+              <mc:Choice xmlns:v="urn:schemas-microsoft-com:vml" Requires="v">
+                <p:oleObj spid="_x0000_s11334" name="Equation" r:id="rId19" imgW="279400" imgH="152400" progId="Equation.3">
+                  <p:embed/>
+                </p:oleObj>
+              </mc:Choice>
+              <mc:Fallback>
+                <p:oleObj name="Equation" r:id="rId19" imgW="279400" imgH="152400" progId="Equation.3">
+                  <p:embed/>
+                  <p:pic>
+                    <p:nvPicPr>
+                      <p:cNvPr id="0" name=""/>
+                      <p:cNvPicPr/>
+                      <p:nvPr/>
+                    </p:nvPicPr>
+                    <p:blipFill>
+                      <a:blip r:embed="rId20"/>
+                      <a:stretch>
+                        <a:fillRect/>
+                      </a:stretch>
+                    </p:blipFill>
+                    <p:spPr>
+                      <a:xfrm>
+                        <a:off x="2805716" y="2454436"/>
+                        <a:ext cx="558800" cy="304800"/>
+                      </a:xfrm>
+                      <a:prstGeom prst="rect">
+                        <a:avLst/>
+                      </a:prstGeom>
+                    </p:spPr>
+                  </p:pic>
+                </p:oleObj>
+              </mc:Fallback>
+            </mc:AlternateContent>
+          </a:graphicData>
+        </a:graphic>
+      </p:graphicFrame>
+      <p:graphicFrame>
+        <p:nvGraphicFramePr>
+          <p:cNvPr id="30" name="Object 29"/>
+          <p:cNvGraphicFramePr>
+            <a:graphicFrameLocks noChangeAspect="1"/>
+          </p:cNvGraphicFramePr>
+          <p:nvPr>
+            <p:extLst>
+              <p:ext uri="{D42A27DB-BD31-4B8C-83A1-F6EECF244321}">
+                <p14:modId xmlns:p14="http://schemas.microsoft.com/office/powerpoint/2010/main" val="3075769714"/>
+              </p:ext>
+            </p:extLst>
+          </p:nvPr>
+        </p:nvGraphicFramePr>
+        <p:xfrm>
+          <a:off x="2817161" y="2759236"/>
+          <a:ext cx="584200" cy="311573"/>
+        </p:xfrm>
+        <a:graphic>
+          <a:graphicData uri="http://schemas.openxmlformats.org/presentationml/2006/ole">
+            <mc:AlternateContent xmlns:mc="http://schemas.openxmlformats.org/markup-compatibility/2006">
+              <mc:Choice xmlns:v="urn:schemas-microsoft-com:vml" Requires="v">
+                <p:oleObj spid="_x0000_s11335" name="Equation" r:id="rId21" imgW="381000" imgH="203200" progId="Equation.3">
+                  <p:embed/>
+                </p:oleObj>
+              </mc:Choice>
+              <mc:Fallback>
+                <p:oleObj name="Equation" r:id="rId21" imgW="381000" imgH="203200" progId="Equation.3">
+                  <p:embed/>
+                  <p:pic>
+                    <p:nvPicPr>
+                      <p:cNvPr id="0" name=""/>
+                      <p:cNvPicPr/>
+                      <p:nvPr/>
+                    </p:nvPicPr>
+                    <p:blipFill>
+                      <a:blip r:embed="rId22"/>
+                      <a:stretch>
+                        <a:fillRect/>
+                      </a:stretch>
+                    </p:blipFill>
+                    <p:spPr>
+                      <a:xfrm>
+                        <a:off x="2817161" y="2759236"/>
+                        <a:ext cx="584200" cy="311573"/>
+                      </a:xfrm>
+                      <a:prstGeom prst="rect">
+                        <a:avLst/>
+                      </a:prstGeom>
+                    </p:spPr>
+                  </p:pic>
+                </p:oleObj>
+              </mc:Fallback>
+            </mc:AlternateContent>
+          </a:graphicData>
+        </a:graphic>
+      </p:graphicFrame>
+      <p:grpSp>
+        <p:nvGrpSpPr>
+          <p:cNvPr id="36" name="Group 35"/>
+          <p:cNvGrpSpPr/>
+          <p:nvPr/>
+        </p:nvGrpSpPr>
+        <p:grpSpPr>
+          <a:xfrm>
+            <a:off x="4441019" y="2381058"/>
+            <a:ext cx="599440" cy="451556"/>
+            <a:chOff x="5542280" y="2134960"/>
+            <a:chExt cx="599440" cy="451556"/>
+          </a:xfrm>
+        </p:grpSpPr>
+        <p:cxnSp>
+          <p:nvCxnSpPr>
+            <p:cNvPr id="11" name="Straight Connector 10"/>
+            <p:cNvCxnSpPr/>
+            <p:nvPr/>
+          </p:nvCxnSpPr>
+          <p:spPr>
+            <a:xfrm>
+              <a:off x="5842000" y="2134960"/>
+              <a:ext cx="0" cy="451556"/>
+            </a:xfrm>
+            <a:prstGeom prst="line">
+              <a:avLst/>
+            </a:prstGeom>
+            <a:ln>
+              <a:headEnd w="sm" len="sm"/>
+              <a:tailEnd w="sm" len="sm"/>
+            </a:ln>
+          </p:spPr>
+          <p:style>
+            <a:lnRef idx="1">
+              <a:schemeClr val="dk1"/>
+            </a:lnRef>
+            <a:fillRef idx="0">
+              <a:schemeClr val="dk1"/>
+            </a:fillRef>
+            <a:effectRef idx="0">
+              <a:schemeClr val="dk1"/>
+            </a:effectRef>
+            <a:fontRef idx="minor">
+              <a:schemeClr val="tx1"/>
+            </a:fontRef>
+          </p:style>
+        </p:cxnSp>
+        <p:cxnSp>
+          <p:nvCxnSpPr>
+            <p:cNvPr id="33" name="Straight Connector 32"/>
+            <p:cNvCxnSpPr/>
+            <p:nvPr/>
+          </p:nvCxnSpPr>
+          <p:spPr>
+            <a:xfrm>
+              <a:off x="5542280" y="2362996"/>
+              <a:ext cx="599440" cy="0"/>
+            </a:xfrm>
+            <a:prstGeom prst="line">
+              <a:avLst/>
+            </a:prstGeom>
+            <a:ln>
+              <a:headEnd w="sm" len="sm"/>
+              <a:tailEnd w="sm" len="sm"/>
+            </a:ln>
+          </p:spPr>
+          <p:style>
+            <a:lnRef idx="1">
+              <a:schemeClr val="dk1"/>
+            </a:lnRef>
+            <a:fillRef idx="0">
+              <a:schemeClr val="dk1"/>
+            </a:fillRef>
+            <a:effectRef idx="0">
+              <a:schemeClr val="dk1"/>
+            </a:effectRef>
+            <a:fontRef idx="minor">
+              <a:schemeClr val="tx1"/>
+            </a:fontRef>
+          </p:style>
+        </p:cxnSp>
+        <p:cxnSp>
+          <p:nvCxnSpPr>
+            <p:cNvPr id="34" name="Straight Connector 33"/>
+            <p:cNvCxnSpPr/>
+            <p:nvPr/>
+          </p:nvCxnSpPr>
+          <p:spPr>
+            <a:xfrm>
+              <a:off x="5842000" y="2230916"/>
+              <a:ext cx="299720" cy="0"/>
+            </a:xfrm>
+            <a:prstGeom prst="line">
+              <a:avLst/>
+            </a:prstGeom>
+            <a:ln w="28575" cmpd="sng">
+              <a:solidFill>
+                <a:schemeClr val="tx1">
+                  <a:lumMod val="75000"/>
+                  <a:lumOff val="25000"/>
+                </a:schemeClr>
+              </a:solidFill>
+              <a:headEnd w="sm" len="sm"/>
+              <a:tailEnd type="arrow" w="sm" len="sm"/>
+            </a:ln>
+          </p:spPr>
+          <p:style>
+            <a:lnRef idx="1">
+              <a:schemeClr val="dk1"/>
+            </a:lnRef>
+            <a:fillRef idx="0">
+              <a:schemeClr val="dk1"/>
+            </a:fillRef>
+            <a:effectRef idx="0">
+              <a:schemeClr val="dk1"/>
+            </a:effectRef>
+            <a:fontRef idx="minor">
+              <a:schemeClr val="tx1"/>
+            </a:fontRef>
+          </p:style>
+        </p:cxnSp>
+        <p:cxnSp>
+          <p:nvCxnSpPr>
+            <p:cNvPr id="35" name="Straight Connector 34"/>
+            <p:cNvCxnSpPr/>
+            <p:nvPr/>
+          </p:nvCxnSpPr>
+          <p:spPr>
+            <a:xfrm>
+              <a:off x="5542280" y="2495076"/>
+              <a:ext cx="299720" cy="0"/>
+            </a:xfrm>
+            <a:prstGeom prst="line">
+              <a:avLst/>
+            </a:prstGeom>
+            <a:ln w="28575" cmpd="sng">
+              <a:solidFill>
+                <a:schemeClr val="tx1">
+                  <a:lumMod val="75000"/>
+                  <a:lumOff val="25000"/>
+                </a:schemeClr>
+              </a:solidFill>
+              <a:headEnd type="arrow" w="sm" len="sm"/>
+              <a:tailEnd w="sm" len="sm"/>
+            </a:ln>
+          </p:spPr>
+          <p:style>
+            <a:lnRef idx="1">
+              <a:schemeClr val="dk1"/>
+            </a:lnRef>
+            <a:fillRef idx="0">
+              <a:schemeClr val="dk1"/>
+            </a:fillRef>
+            <a:effectRef idx="0">
+              <a:schemeClr val="dk1"/>
+            </a:effectRef>
+            <a:fontRef idx="minor">
+              <a:schemeClr val="tx1"/>
+            </a:fontRef>
+          </p:style>
+        </p:cxnSp>
+      </p:grpSp>
+    </p:spTree>
+    <p:extLst>
+      <p:ext uri="{BB962C8B-B14F-4D97-AF65-F5344CB8AC3E}">
+        <p14:creationId xmlns:p14="http://schemas.microsoft.com/office/powerpoint/2010/main" val="3822885704"/>
+      </p:ext>
+    </p:extLst>
+  </p:cSld>
+  <p:clrMapOvr>
+    <a:masterClrMapping/>
+  </p:clrMapOvr>
+</p:sld>
+</file>
+
+<file path=ppt/slides/slide15.xml><?xml version="1.0" encoding="utf-8"?>
+<p:sld xmlns:a="http://schemas.openxmlformats.org/drawingml/2006/main" xmlns:r="http://schemas.openxmlformats.org/officeDocument/2006/relationships" xmlns:p="http://schemas.openxmlformats.org/presentationml/2006/main">
+  <p:cSld>
+    <p:spTree>
+      <p:nvGrpSpPr>
+        <p:cNvPr id="1" name=""/>
+        <p:cNvGrpSpPr/>
+        <p:nvPr/>
+      </p:nvGrpSpPr>
+      <p:grpSpPr>
+        <a:xfrm>
+          <a:off x="0" y="0"/>
+          <a:ext cx="0" cy="0"/>
+          <a:chOff x="0" y="0"/>
+          <a:chExt cx="0" cy="0"/>
+        </a:xfrm>
+      </p:grpSpPr>
+      <p:sp>
+        <p:nvSpPr>
+          <p:cNvPr id="4" name="Oval 3"/>
+          <p:cNvSpPr/>
+          <p:nvPr/>
+        </p:nvSpPr>
+        <p:spPr>
+          <a:xfrm rot="20239385">
+            <a:off x="1398243" y="1797174"/>
+            <a:ext cx="6865129" cy="3230992"/>
+          </a:xfrm>
+          <a:prstGeom prst="ellipse">
+            <a:avLst/>
+          </a:prstGeom>
+        </p:spPr>
+        <p:style>
+          <a:lnRef idx="2">
+            <a:schemeClr val="dk1"/>
+          </a:lnRef>
+          <a:fillRef idx="1">
+            <a:schemeClr val="lt1"/>
+          </a:fillRef>
+          <a:effectRef idx="0">
+            <a:schemeClr val="dk1"/>
+          </a:effectRef>
+          <a:fontRef idx="minor">
+            <a:schemeClr val="dk1"/>
+          </a:fontRef>
+        </p:style>
+        <p:txBody>
+          <a:bodyPr rtlCol="0" anchor="ctr"/>
+          <a:lstStyle/>
+          <a:p>
+            <a:pPr algn="ctr"/>
+            <a:endParaRPr lang="en-US"/>
+          </a:p>
+        </p:txBody>
+      </p:sp>
+      <p:sp>
+        <p:nvSpPr>
+          <p:cNvPr id="5" name="Oval 4"/>
+          <p:cNvSpPr/>
+          <p:nvPr/>
+        </p:nvSpPr>
+        <p:spPr>
+          <a:xfrm rot="20239385">
+            <a:off x="1895451" y="2067614"/>
+            <a:ext cx="5883008" cy="2680750"/>
+          </a:xfrm>
+          <a:prstGeom prst="ellipse">
+            <a:avLst/>
+          </a:prstGeom>
+        </p:spPr>
+        <p:style>
+          <a:lnRef idx="2">
+            <a:schemeClr val="dk1"/>
+          </a:lnRef>
+          <a:fillRef idx="1">
+            <a:schemeClr val="lt1"/>
+          </a:fillRef>
+          <a:effectRef idx="0">
+            <a:schemeClr val="dk1"/>
+          </a:effectRef>
+          <a:fontRef idx="minor">
+            <a:schemeClr val="dk1"/>
+          </a:fontRef>
+        </p:style>
+        <p:txBody>
+          <a:bodyPr rtlCol="0" anchor="ctr"/>
+          <a:lstStyle/>
+          <a:p>
+            <a:pPr algn="ctr"/>
+            <a:endParaRPr lang="en-US"/>
+          </a:p>
+        </p:txBody>
+      </p:sp>
+      <p:sp>
+        <p:nvSpPr>
+          <p:cNvPr id="6" name="Oval 5"/>
+          <p:cNvSpPr/>
+          <p:nvPr/>
+        </p:nvSpPr>
+        <p:spPr>
+          <a:xfrm rot="20239385">
+            <a:off x="2314054" y="2397570"/>
+            <a:ext cx="5086143" cy="2061197"/>
+          </a:xfrm>
+          <a:prstGeom prst="ellipse">
+            <a:avLst/>
+          </a:prstGeom>
+        </p:spPr>
+        <p:style>
+          <a:lnRef idx="2">
+            <a:schemeClr val="dk1"/>
+          </a:lnRef>
+          <a:fillRef idx="1">
+            <a:schemeClr val="lt1"/>
+          </a:fillRef>
+          <a:effectRef idx="0">
+            <a:schemeClr val="dk1"/>
+          </a:effectRef>
+          <a:fontRef idx="minor">
+            <a:schemeClr val="dk1"/>
+          </a:fontRef>
+        </p:style>
+        <p:txBody>
+          <a:bodyPr rtlCol="0" anchor="ctr"/>
+          <a:lstStyle/>
+          <a:p>
+            <a:pPr algn="ctr"/>
+            <a:endParaRPr lang="en-US"/>
+          </a:p>
+        </p:txBody>
+      </p:sp>
+      <p:sp>
+        <p:nvSpPr>
+          <p:cNvPr id="7" name="Oval 6"/>
+          <p:cNvSpPr/>
+          <p:nvPr/>
+        </p:nvSpPr>
+        <p:spPr>
+          <a:xfrm rot="20239385">
+            <a:off x="2821495" y="2649101"/>
+            <a:ext cx="4145962" cy="1614159"/>
+          </a:xfrm>
+          <a:prstGeom prst="ellipse">
+            <a:avLst/>
+          </a:prstGeom>
+        </p:spPr>
+        <p:style>
+          <a:lnRef idx="2">
+            <a:schemeClr val="dk1"/>
+          </a:lnRef>
+          <a:fillRef idx="1">
+            <a:schemeClr val="lt1"/>
+          </a:fillRef>
+          <a:effectRef idx="0">
+            <a:schemeClr val="dk1"/>
+          </a:effectRef>
+          <a:fontRef idx="minor">
+            <a:schemeClr val="dk1"/>
+          </a:fontRef>
+        </p:style>
+        <p:txBody>
+          <a:bodyPr rtlCol="0" anchor="ctr"/>
+          <a:lstStyle/>
+          <a:p>
+            <a:pPr algn="ctr"/>
+            <a:endParaRPr lang="en-US"/>
+          </a:p>
+        </p:txBody>
+      </p:sp>
+      <p:sp>
+        <p:nvSpPr>
+          <p:cNvPr id="8" name="Oval 7"/>
+          <p:cNvSpPr/>
+          <p:nvPr/>
+        </p:nvSpPr>
+        <p:spPr>
+          <a:xfrm rot="20239385">
+            <a:off x="3254329" y="2933518"/>
+            <a:ext cx="3264596" cy="1067007"/>
+          </a:xfrm>
+          <a:prstGeom prst="ellipse">
+            <a:avLst/>
+          </a:prstGeom>
+        </p:spPr>
+        <p:style>
+          <a:lnRef idx="2">
+            <a:schemeClr val="dk1"/>
+          </a:lnRef>
+          <a:fillRef idx="1">
+            <a:schemeClr val="lt1"/>
+          </a:fillRef>
+          <a:effectRef idx="0">
+            <a:schemeClr val="dk1"/>
+          </a:effectRef>
+          <a:fontRef idx="minor">
+            <a:schemeClr val="dk1"/>
+          </a:fontRef>
+        </p:style>
+        <p:txBody>
+          <a:bodyPr rtlCol="0" anchor="ctr"/>
+          <a:lstStyle/>
+          <a:p>
+            <a:pPr algn="ctr"/>
+            <a:endParaRPr lang="en-US"/>
+          </a:p>
+        </p:txBody>
+      </p:sp>
+      <p:sp>
+        <p:nvSpPr>
+          <p:cNvPr id="9" name="Oval 8"/>
+          <p:cNvSpPr/>
+          <p:nvPr/>
+        </p:nvSpPr>
+        <p:spPr>
+          <a:xfrm rot="20239385">
+            <a:off x="3771256" y="3171333"/>
+            <a:ext cx="2215056" cy="631732"/>
+          </a:xfrm>
+          <a:prstGeom prst="ellipse">
+            <a:avLst/>
+          </a:prstGeom>
+        </p:spPr>
+        <p:style>
+          <a:lnRef idx="2">
+            <a:schemeClr val="dk1"/>
+          </a:lnRef>
+          <a:fillRef idx="1">
+            <a:schemeClr val="lt1"/>
+          </a:fillRef>
+          <a:effectRef idx="0">
+            <a:schemeClr val="dk1"/>
+          </a:effectRef>
+          <a:fontRef idx="minor">
+            <a:schemeClr val="dk1"/>
+          </a:fontRef>
+        </p:style>
+        <p:txBody>
+          <a:bodyPr rtlCol="0" anchor="ctr"/>
+          <a:lstStyle/>
+          <a:p>
+            <a:pPr algn="ctr"/>
+            <a:endParaRPr lang="en-US"/>
+          </a:p>
+        </p:txBody>
+      </p:sp>
+      <p:cxnSp>
+        <p:nvCxnSpPr>
+          <p:cNvPr id="10" name="Straight Arrow Connector 9"/>
+          <p:cNvCxnSpPr/>
+          <p:nvPr/>
+        </p:nvCxnSpPr>
+        <p:spPr>
+          <a:xfrm flipV="1">
+            <a:off x="3174833" y="2768761"/>
+            <a:ext cx="0" cy="2640804"/>
+          </a:xfrm>
+          <a:prstGeom prst="straightConnector1">
+            <a:avLst/>
+          </a:prstGeom>
+          <a:ln>
+            <a:solidFill>
+              <a:srgbClr val="FF0000"/>
+            </a:solidFill>
+            <a:tailEnd type="arrow"/>
+          </a:ln>
+        </p:spPr>
+        <p:style>
+          <a:lnRef idx="1">
+            <a:schemeClr val="dk1"/>
+          </a:lnRef>
+          <a:fillRef idx="0">
+            <a:schemeClr val="dk1"/>
+          </a:fillRef>
+          <a:effectRef idx="0">
+            <a:schemeClr val="dk1"/>
+          </a:effectRef>
+          <a:fontRef idx="minor">
+            <a:schemeClr val="tx1"/>
+          </a:fontRef>
+        </p:style>
+      </p:cxnSp>
+      <p:cxnSp>
+        <p:nvCxnSpPr>
+          <p:cNvPr id="15" name="Straight Arrow Connector 14"/>
+          <p:cNvCxnSpPr/>
+          <p:nvPr/>
+        </p:nvCxnSpPr>
+        <p:spPr>
+          <a:xfrm>
+            <a:off x="3174832" y="2768761"/>
+            <a:ext cx="1597624" cy="2231312"/>
+          </a:xfrm>
+          <a:prstGeom prst="straightConnector1">
+            <a:avLst/>
+          </a:prstGeom>
+          <a:ln>
+            <a:solidFill>
+              <a:srgbClr val="FF0000"/>
+            </a:solidFill>
+            <a:tailEnd type="arrow"/>
+          </a:ln>
+        </p:spPr>
+        <p:style>
+          <a:lnRef idx="1">
+            <a:schemeClr val="dk1"/>
+          </a:lnRef>
+          <a:fillRef idx="0">
+            <a:schemeClr val="dk1"/>
+          </a:fillRef>
+          <a:effectRef idx="0">
+            <a:schemeClr val="dk1"/>
+          </a:effectRef>
+          <a:fontRef idx="minor">
+            <a:schemeClr val="tx1"/>
+          </a:fontRef>
+        </p:style>
+      </p:cxnSp>
+      <p:cxnSp>
+        <p:nvCxnSpPr>
+          <p:cNvPr id="18" name="Straight Arrow Connector 17"/>
+          <p:cNvCxnSpPr/>
+          <p:nvPr/>
+        </p:nvCxnSpPr>
+        <p:spPr>
+          <a:xfrm flipH="1" flipV="1">
+            <a:off x="3912901" y="2193534"/>
+            <a:ext cx="859556" cy="2806539"/>
+          </a:xfrm>
+          <a:prstGeom prst="straightConnector1">
+            <a:avLst/>
+          </a:prstGeom>
+          <a:ln>
+            <a:solidFill>
+              <a:srgbClr val="FF0000"/>
+            </a:solidFill>
+            <a:tailEnd type="arrow"/>
+          </a:ln>
+        </p:spPr>
+        <p:style>
+          <a:lnRef idx="1">
+            <a:schemeClr val="dk1"/>
+          </a:lnRef>
+          <a:fillRef idx="0">
+            <a:schemeClr val="dk1"/>
+          </a:fillRef>
+          <a:effectRef idx="0">
+            <a:schemeClr val="dk1"/>
+          </a:effectRef>
+          <a:fontRef idx="minor">
+            <a:schemeClr val="tx1"/>
+          </a:fontRef>
+        </p:style>
+      </p:cxnSp>
+      <p:cxnSp>
+        <p:nvCxnSpPr>
+          <p:cNvPr id="21" name="Straight Arrow Connector 20"/>
+          <p:cNvCxnSpPr/>
+          <p:nvPr/>
+        </p:nvCxnSpPr>
+        <p:spPr>
+          <a:xfrm>
+            <a:off x="3912901" y="2193534"/>
+            <a:ext cx="1436868" cy="2899056"/>
+          </a:xfrm>
+          <a:prstGeom prst="straightConnector1">
+            <a:avLst/>
+          </a:prstGeom>
+          <a:ln>
+            <a:solidFill>
+              <a:srgbClr val="FF0000"/>
+            </a:solidFill>
+            <a:tailEnd type="arrow"/>
+          </a:ln>
+        </p:spPr>
+        <p:style>
+          <a:lnRef idx="1">
+            <a:schemeClr val="dk1"/>
+          </a:lnRef>
+          <a:fillRef idx="0">
+            <a:schemeClr val="dk1"/>
+          </a:fillRef>
+          <a:effectRef idx="0">
+            <a:schemeClr val="dk1"/>
+          </a:effectRef>
+          <a:fontRef idx="minor">
+            <a:schemeClr val="tx1"/>
+          </a:fontRef>
+        </p:style>
+      </p:cxnSp>
+    </p:spTree>
+    <p:extLst>
+      <p:ext uri="{BB962C8B-B14F-4D97-AF65-F5344CB8AC3E}">
+        <p14:creationId xmlns:p14="http://schemas.microsoft.com/office/powerpoint/2010/main" val="3778296886"/>
+      </p:ext>
+    </p:extLst>
+  </p:cSld>
+  <p:clrMapOvr>
+    <a:masterClrMapping/>
+  </p:clrMapOvr>
+</p:sld>
+</file>
+
+<file path=ppt/slides/slide16.xml><?xml version="1.0" encoding="utf-8"?>
+<p:sld xmlns:a="http://schemas.openxmlformats.org/drawingml/2006/main" xmlns:r="http://schemas.openxmlformats.org/officeDocument/2006/relationships" xmlns:p="http://schemas.openxmlformats.org/presentationml/2006/main">
+  <p:cSld>
+    <p:spTree>
+      <p:nvGrpSpPr>
+        <p:cNvPr id="1" name=""/>
+        <p:cNvGrpSpPr/>
+        <p:nvPr/>
+      </p:nvGrpSpPr>
+      <p:grpSpPr>
+        <a:xfrm>
+          <a:off x="0" y="0"/>
+          <a:ext cx="0" cy="0"/>
+          <a:chOff x="0" y="0"/>
+          <a:chExt cx="0" cy="0"/>
+        </a:xfrm>
+      </p:grpSpPr>
+      <p:grpSp>
+        <p:nvGrpSpPr>
+          <p:cNvPr id="26" name="Group 25"/>
+          <p:cNvGrpSpPr/>
+          <p:nvPr/>
+        </p:nvGrpSpPr>
+        <p:grpSpPr>
+          <a:xfrm>
+            <a:off x="1824055" y="1443123"/>
+            <a:ext cx="4694914" cy="912626"/>
+            <a:chOff x="2295999" y="2011755"/>
+            <a:chExt cx="4694914" cy="912626"/>
+          </a:xfrm>
+          <a:effectLst/>
+        </p:grpSpPr>
+        <p:sp>
+          <p:nvSpPr>
+            <p:cNvPr id="16" name="Oval 15"/>
+            <p:cNvSpPr/>
+            <p:nvPr/>
+          </p:nvSpPr>
+          <p:spPr>
+            <a:xfrm>
+              <a:off x="2295999" y="2021270"/>
+              <a:ext cx="903111" cy="903111"/>
+            </a:xfrm>
+            <a:prstGeom prst="ellipse">
+              <a:avLst/>
+            </a:prstGeom>
+            <a:noFill/>
+          </p:spPr>
+          <p:style>
+            <a:lnRef idx="2">
+              <a:schemeClr val="dk1"/>
+            </a:lnRef>
+            <a:fillRef idx="1">
+              <a:schemeClr val="lt1"/>
+            </a:fillRef>
+            <a:effectRef idx="0">
+              <a:schemeClr val="dk1"/>
+            </a:effectRef>
+            <a:fontRef idx="minor">
+              <a:schemeClr val="dk1"/>
+            </a:fontRef>
+          </p:style>
+          <p:txBody>
+            <a:bodyPr rtlCol="0" anchor="ctr"/>
+            <a:lstStyle/>
+            <a:p>
+              <a:pPr algn="ctr"/>
+              <a:endParaRPr lang="en-US"/>
+            </a:p>
+          </p:txBody>
+        </p:sp>
+        <p:sp>
+          <p:nvSpPr>
+            <p:cNvPr id="17" name="Oval 16"/>
+            <p:cNvSpPr/>
+            <p:nvPr/>
+          </p:nvSpPr>
+          <p:spPr>
+            <a:xfrm>
+              <a:off x="3563238" y="2021270"/>
+              <a:ext cx="903111" cy="903111"/>
+            </a:xfrm>
+            <a:prstGeom prst="ellipse">
+              <a:avLst/>
+            </a:prstGeom>
+            <a:noFill/>
+          </p:spPr>
+          <p:style>
+            <a:lnRef idx="2">
+              <a:schemeClr val="dk1"/>
+            </a:lnRef>
+            <a:fillRef idx="1">
+              <a:schemeClr val="lt1"/>
+            </a:fillRef>
+            <a:effectRef idx="0">
+              <a:schemeClr val="dk1"/>
+            </a:effectRef>
+            <a:fontRef idx="minor">
+              <a:schemeClr val="dk1"/>
+            </a:fontRef>
+          </p:style>
+          <p:txBody>
+            <a:bodyPr rtlCol="0" anchor="ctr"/>
+            <a:lstStyle/>
+            <a:p>
+              <a:pPr algn="ctr"/>
+              <a:endParaRPr lang="en-US"/>
+            </a:p>
+          </p:txBody>
+        </p:sp>
+        <p:sp>
+          <p:nvSpPr>
+            <p:cNvPr id="18" name="Oval 17"/>
+            <p:cNvSpPr/>
+            <p:nvPr/>
+          </p:nvSpPr>
+          <p:spPr>
+            <a:xfrm>
+              <a:off x="6087802" y="2011755"/>
+              <a:ext cx="903111" cy="903111"/>
+            </a:xfrm>
+            <a:prstGeom prst="ellipse">
+              <a:avLst/>
+            </a:prstGeom>
+            <a:noFill/>
+          </p:spPr>
+          <p:style>
+            <a:lnRef idx="2">
+              <a:schemeClr val="dk1"/>
+            </a:lnRef>
+            <a:fillRef idx="1">
+              <a:schemeClr val="lt1"/>
+            </a:fillRef>
+            <a:effectRef idx="0">
+              <a:schemeClr val="dk1"/>
+            </a:effectRef>
+            <a:fontRef idx="minor">
+              <a:schemeClr val="dk1"/>
+            </a:fontRef>
+          </p:style>
+          <p:txBody>
+            <a:bodyPr rtlCol="0" anchor="ctr"/>
+            <a:lstStyle/>
+            <a:p>
+              <a:pPr algn="ctr"/>
+              <a:endParaRPr lang="en-US"/>
+            </a:p>
+          </p:txBody>
+        </p:sp>
+        <p:grpSp>
+          <p:nvGrpSpPr>
+            <p:cNvPr id="19" name="Group 18"/>
+            <p:cNvGrpSpPr/>
+            <p:nvPr/>
+          </p:nvGrpSpPr>
+          <p:grpSpPr>
+            <a:xfrm rot="16200000">
+              <a:off x="5224522" y="2265251"/>
+              <a:ext cx="51361" cy="378741"/>
+              <a:chOff x="1984024" y="3584222"/>
+              <a:chExt cx="51361" cy="378741"/>
+            </a:xfrm>
+          </p:grpSpPr>
+          <p:sp>
+            <p:nvSpPr>
+              <p:cNvPr id="20" name="Oval 19"/>
+              <p:cNvSpPr/>
+              <p:nvPr/>
+            </p:nvSpPr>
+            <p:spPr>
+              <a:xfrm>
+                <a:off x="1989666" y="3584222"/>
+                <a:ext cx="45719" cy="45719"/>
+              </a:xfrm>
+              <a:prstGeom prst="ellipse">
+                <a:avLst/>
+              </a:prstGeom>
+              <a:solidFill>
+                <a:schemeClr val="tx1"/>
+              </a:solidFill>
+              <a:ln/>
+            </p:spPr>
+            <p:style>
+              <a:lnRef idx="2">
+                <a:schemeClr val="dk1"/>
+              </a:lnRef>
+              <a:fillRef idx="1">
+                <a:schemeClr val="lt1"/>
+              </a:fillRef>
+              <a:effectRef idx="0">
+                <a:schemeClr val="dk1"/>
+              </a:effectRef>
+              <a:fontRef idx="minor">
+                <a:schemeClr val="dk1"/>
+              </a:fontRef>
+            </p:style>
+            <p:txBody>
+              <a:bodyPr rtlCol="0" anchor="ctr"/>
+              <a:lstStyle/>
+              <a:p>
+                <a:pPr algn="ctr"/>
+                <a:endParaRPr lang="en-US"/>
+              </a:p>
+            </p:txBody>
+          </p:sp>
+          <p:sp>
+            <p:nvSpPr>
+              <p:cNvPr id="21" name="Oval 20"/>
+              <p:cNvSpPr/>
+              <p:nvPr/>
+            </p:nvSpPr>
+            <p:spPr>
+              <a:xfrm>
+                <a:off x="1986845" y="3750733"/>
+                <a:ext cx="45719" cy="45719"/>
+              </a:xfrm>
+              <a:prstGeom prst="ellipse">
+                <a:avLst/>
+              </a:prstGeom>
+              <a:solidFill>
+                <a:schemeClr val="tx1"/>
+              </a:solidFill>
+              <a:ln/>
+            </p:spPr>
+            <p:style>
+              <a:lnRef idx="2">
+                <a:schemeClr val="dk1"/>
+              </a:lnRef>
+              <a:fillRef idx="1">
+                <a:schemeClr val="lt1"/>
+              </a:fillRef>
+              <a:effectRef idx="0">
+                <a:schemeClr val="dk1"/>
+              </a:effectRef>
+              <a:fontRef idx="minor">
+                <a:schemeClr val="dk1"/>
+              </a:fontRef>
+            </p:style>
+            <p:txBody>
+              <a:bodyPr rtlCol="0" anchor="ctr"/>
+              <a:lstStyle/>
+              <a:p>
+                <a:pPr algn="ctr"/>
+                <a:endParaRPr lang="en-US"/>
+              </a:p>
+            </p:txBody>
+          </p:sp>
+          <p:sp>
+            <p:nvSpPr>
+              <p:cNvPr id="22" name="Oval 21"/>
+              <p:cNvSpPr/>
+              <p:nvPr/>
+            </p:nvSpPr>
+            <p:spPr>
+              <a:xfrm>
+                <a:off x="1984024" y="3917244"/>
+                <a:ext cx="45719" cy="45719"/>
+              </a:xfrm>
+              <a:prstGeom prst="ellipse">
+                <a:avLst/>
+              </a:prstGeom>
+              <a:solidFill>
+                <a:schemeClr val="tx1"/>
+              </a:solidFill>
+              <a:ln/>
+            </p:spPr>
+            <p:style>
+              <a:lnRef idx="2">
+                <a:schemeClr val="dk1"/>
+              </a:lnRef>
+              <a:fillRef idx="1">
+                <a:schemeClr val="lt1"/>
+              </a:fillRef>
+              <a:effectRef idx="0">
+                <a:schemeClr val="dk1"/>
+              </a:effectRef>
+              <a:fontRef idx="minor">
+                <a:schemeClr val="dk1"/>
+              </a:fontRef>
+            </p:style>
+            <p:txBody>
+              <a:bodyPr rtlCol="0" anchor="ctr"/>
+              <a:lstStyle/>
+              <a:p>
+                <a:pPr algn="ctr"/>
+                <a:endParaRPr lang="en-US"/>
+              </a:p>
+            </p:txBody>
+          </p:sp>
+        </p:grpSp>
+      </p:grpSp>
+      <p:grpSp>
+        <p:nvGrpSpPr>
+          <p:cNvPr id="25" name="Group 24"/>
+          <p:cNvGrpSpPr/>
+          <p:nvPr/>
+        </p:nvGrpSpPr>
+        <p:grpSpPr>
+          <a:xfrm>
+            <a:off x="726110" y="4116789"/>
+            <a:ext cx="7217094" cy="930322"/>
+            <a:chOff x="1068796" y="4358661"/>
+            <a:chExt cx="7217094" cy="930322"/>
+          </a:xfrm>
+        </p:grpSpPr>
+        <p:sp>
+          <p:nvSpPr>
+            <p:cNvPr id="7" name="Oval 6"/>
+            <p:cNvSpPr/>
+            <p:nvPr/>
+          </p:nvSpPr>
+          <p:spPr>
+            <a:xfrm>
+              <a:off x="3590976" y="4368176"/>
+              <a:ext cx="903111" cy="903111"/>
+            </a:xfrm>
+            <a:prstGeom prst="ellipse">
+              <a:avLst/>
+            </a:prstGeom>
+            <a:noFill/>
+          </p:spPr>
+          <p:style>
+            <a:lnRef idx="2">
+              <a:schemeClr val="dk1"/>
+            </a:lnRef>
+            <a:fillRef idx="1">
+              <a:schemeClr val="lt1"/>
+            </a:fillRef>
+            <a:effectRef idx="0">
+              <a:schemeClr val="dk1"/>
+            </a:effectRef>
+            <a:fontRef idx="minor">
+              <a:schemeClr val="dk1"/>
+            </a:fontRef>
+          </p:style>
+          <p:txBody>
+            <a:bodyPr rtlCol="0" anchor="ctr"/>
+            <a:lstStyle/>
+            <a:p>
+              <a:pPr algn="ctr"/>
+              <a:endParaRPr lang="en-US"/>
+            </a:p>
+          </p:txBody>
+        </p:sp>
+        <p:sp>
+          <p:nvSpPr>
+            <p:cNvPr id="8" name="Oval 7"/>
+            <p:cNvSpPr/>
+            <p:nvPr/>
+          </p:nvSpPr>
+          <p:spPr>
+            <a:xfrm>
+              <a:off x="4858215" y="4368176"/>
+              <a:ext cx="903111" cy="903111"/>
+            </a:xfrm>
+            <a:prstGeom prst="ellipse">
+              <a:avLst/>
+            </a:prstGeom>
+            <a:noFill/>
+          </p:spPr>
+          <p:style>
+            <a:lnRef idx="2">
+              <a:schemeClr val="dk1"/>
+            </a:lnRef>
+            <a:fillRef idx="1">
+              <a:schemeClr val="lt1"/>
+            </a:fillRef>
+            <a:effectRef idx="0">
+              <a:schemeClr val="dk1"/>
+            </a:effectRef>
+            <a:fontRef idx="minor">
+              <a:schemeClr val="dk1"/>
+            </a:fontRef>
+          </p:style>
+          <p:txBody>
+            <a:bodyPr rtlCol="0" anchor="ctr"/>
+            <a:lstStyle/>
+            <a:p>
+              <a:pPr algn="ctr"/>
+              <a:endParaRPr lang="en-US"/>
+            </a:p>
+          </p:txBody>
+        </p:sp>
+        <p:sp>
+          <p:nvSpPr>
+            <p:cNvPr id="11" name="Oval 10"/>
+            <p:cNvSpPr/>
+            <p:nvPr/>
+          </p:nvSpPr>
+          <p:spPr>
+            <a:xfrm>
+              <a:off x="7382779" y="4358661"/>
+              <a:ext cx="903111" cy="903111"/>
+            </a:xfrm>
+            <a:prstGeom prst="ellipse">
+              <a:avLst/>
+            </a:prstGeom>
+            <a:noFill/>
+          </p:spPr>
+          <p:style>
+            <a:lnRef idx="2">
+              <a:schemeClr val="dk1"/>
+            </a:lnRef>
+            <a:fillRef idx="1">
+              <a:schemeClr val="lt1"/>
+            </a:fillRef>
+            <a:effectRef idx="0">
+              <a:schemeClr val="dk1"/>
+            </a:effectRef>
+            <a:fontRef idx="minor">
+              <a:schemeClr val="dk1"/>
+            </a:fontRef>
+          </p:style>
+          <p:txBody>
+            <a:bodyPr rtlCol="0" anchor="ctr"/>
+            <a:lstStyle/>
+            <a:p>
+              <a:pPr algn="ctr"/>
+              <a:endParaRPr lang="en-US"/>
+            </a:p>
+          </p:txBody>
+        </p:sp>
+        <p:grpSp>
+          <p:nvGrpSpPr>
+            <p:cNvPr id="15" name="Group 14"/>
+            <p:cNvGrpSpPr/>
+            <p:nvPr/>
+          </p:nvGrpSpPr>
+          <p:grpSpPr>
+            <a:xfrm rot="16200000">
+              <a:off x="6519499" y="4612157"/>
+              <a:ext cx="51361" cy="378741"/>
+              <a:chOff x="1984024" y="3584222"/>
+              <a:chExt cx="51361" cy="378741"/>
+            </a:xfrm>
+          </p:grpSpPr>
+          <p:sp>
+            <p:nvSpPr>
+              <p:cNvPr id="12" name="Oval 11"/>
+              <p:cNvSpPr/>
+              <p:nvPr/>
+            </p:nvSpPr>
+            <p:spPr>
+              <a:xfrm>
+                <a:off x="1989666" y="3584222"/>
+                <a:ext cx="45719" cy="45719"/>
+              </a:xfrm>
+              <a:prstGeom prst="ellipse">
+                <a:avLst/>
+              </a:prstGeom>
+              <a:solidFill>
+                <a:schemeClr val="tx1"/>
+              </a:solidFill>
+              <a:ln/>
+            </p:spPr>
+            <p:style>
+              <a:lnRef idx="2">
+                <a:schemeClr val="dk1"/>
+              </a:lnRef>
+              <a:fillRef idx="1">
+                <a:schemeClr val="lt1"/>
+              </a:fillRef>
+              <a:effectRef idx="0">
+                <a:schemeClr val="dk1"/>
+              </a:effectRef>
+              <a:fontRef idx="minor">
+                <a:schemeClr val="dk1"/>
+              </a:fontRef>
+            </p:style>
+            <p:txBody>
+              <a:bodyPr rtlCol="0" anchor="ctr"/>
+              <a:lstStyle/>
+              <a:p>
+                <a:pPr algn="ctr"/>
+                <a:endParaRPr lang="en-US"/>
+              </a:p>
+            </p:txBody>
+          </p:sp>
+          <p:sp>
+            <p:nvSpPr>
+              <p:cNvPr id="13" name="Oval 12"/>
+              <p:cNvSpPr/>
+              <p:nvPr/>
+            </p:nvSpPr>
+            <p:spPr>
+              <a:xfrm>
+                <a:off x="1986845" y="3750733"/>
+                <a:ext cx="45719" cy="45719"/>
+              </a:xfrm>
+              <a:prstGeom prst="ellipse">
+                <a:avLst/>
+              </a:prstGeom>
+              <a:solidFill>
+                <a:schemeClr val="tx1"/>
+              </a:solidFill>
+              <a:ln/>
+            </p:spPr>
+            <p:style>
+              <a:lnRef idx="2">
+                <a:schemeClr val="dk1"/>
+              </a:lnRef>
+              <a:fillRef idx="1">
+                <a:schemeClr val="lt1"/>
+              </a:fillRef>
+              <a:effectRef idx="0">
+                <a:schemeClr val="dk1"/>
+              </a:effectRef>
+              <a:fontRef idx="minor">
+                <a:schemeClr val="dk1"/>
+              </a:fontRef>
+            </p:style>
+            <p:txBody>
+              <a:bodyPr rtlCol="0" anchor="ctr"/>
+              <a:lstStyle/>
+              <a:p>
+                <a:pPr algn="ctr"/>
+                <a:endParaRPr lang="en-US"/>
+              </a:p>
+            </p:txBody>
+          </p:sp>
+          <p:sp>
+            <p:nvSpPr>
+              <p:cNvPr id="14" name="Oval 13"/>
+              <p:cNvSpPr/>
+              <p:nvPr/>
+            </p:nvSpPr>
+            <p:spPr>
+              <a:xfrm>
+                <a:off x="1984024" y="3917244"/>
+                <a:ext cx="45719" cy="45719"/>
+              </a:xfrm>
+              <a:prstGeom prst="ellipse">
+                <a:avLst/>
+              </a:prstGeom>
+              <a:solidFill>
+                <a:schemeClr val="tx1"/>
+              </a:solidFill>
+              <a:ln/>
+            </p:spPr>
+            <p:style>
+              <a:lnRef idx="2">
+                <a:schemeClr val="dk1"/>
+              </a:lnRef>
+              <a:fillRef idx="1">
+                <a:schemeClr val="lt1"/>
+              </a:fillRef>
+              <a:effectRef idx="0">
+                <a:schemeClr val="dk1"/>
+              </a:effectRef>
+              <a:fontRef idx="minor">
+                <a:schemeClr val="dk1"/>
+              </a:fontRef>
+            </p:style>
+            <p:txBody>
+              <a:bodyPr rtlCol="0" anchor="ctr"/>
+              <a:lstStyle/>
+              <a:p>
+                <a:pPr algn="ctr"/>
+                <a:endParaRPr lang="en-US"/>
+              </a:p>
+            </p:txBody>
+          </p:sp>
+        </p:grpSp>
+        <p:sp>
+          <p:nvSpPr>
+            <p:cNvPr id="23" name="Oval 22"/>
+            <p:cNvSpPr/>
+            <p:nvPr/>
+          </p:nvSpPr>
+          <p:spPr>
+            <a:xfrm>
+              <a:off x="1068796" y="4385872"/>
+              <a:ext cx="903111" cy="903111"/>
+            </a:xfrm>
+            <a:prstGeom prst="ellipse">
+              <a:avLst/>
+            </a:prstGeom>
+            <a:noFill/>
+          </p:spPr>
+          <p:style>
+            <a:lnRef idx="2">
+              <a:schemeClr val="dk1"/>
+            </a:lnRef>
+            <a:fillRef idx="1">
+              <a:schemeClr val="lt1"/>
+            </a:fillRef>
+            <a:effectRef idx="0">
+              <a:schemeClr val="dk1"/>
+            </a:effectRef>
+            <a:fontRef idx="minor">
+              <a:schemeClr val="dk1"/>
+            </a:fontRef>
+          </p:style>
+          <p:txBody>
+            <a:bodyPr rtlCol="0" anchor="ctr"/>
+            <a:lstStyle/>
+            <a:p>
+              <a:pPr algn="ctr"/>
+              <a:endParaRPr lang="en-US"/>
+            </a:p>
+          </p:txBody>
+        </p:sp>
+        <p:sp>
+          <p:nvSpPr>
+            <p:cNvPr id="24" name="Oval 23"/>
+            <p:cNvSpPr/>
+            <p:nvPr/>
+          </p:nvSpPr>
+          <p:spPr>
+            <a:xfrm>
+              <a:off x="2329886" y="4377024"/>
+              <a:ext cx="903111" cy="903111"/>
+            </a:xfrm>
+            <a:prstGeom prst="ellipse">
+              <a:avLst/>
+            </a:prstGeom>
+            <a:noFill/>
+          </p:spPr>
+          <p:style>
+            <a:lnRef idx="2">
+              <a:schemeClr val="dk1"/>
+            </a:lnRef>
+            <a:fillRef idx="1">
+              <a:schemeClr val="lt1"/>
+            </a:fillRef>
+            <a:effectRef idx="0">
+              <a:schemeClr val="dk1"/>
+            </a:effectRef>
+            <a:fontRef idx="minor">
+              <a:schemeClr val="dk1"/>
+            </a:fontRef>
+          </p:style>
+          <p:txBody>
+            <a:bodyPr rtlCol="0" anchor="ctr"/>
+            <a:lstStyle/>
+            <a:p>
+              <a:pPr algn="ctr"/>
+              <a:endParaRPr lang="en-US"/>
+            </a:p>
+          </p:txBody>
+        </p:sp>
+      </p:grpSp>
+      <p:cxnSp>
+        <p:nvCxnSpPr>
+          <p:cNvPr id="29" name="Straight Arrow Connector 28"/>
+          <p:cNvCxnSpPr/>
+          <p:nvPr/>
+        </p:nvCxnSpPr>
+        <p:spPr>
+          <a:xfrm flipV="1">
+            <a:off x="1338930" y="2335593"/>
+            <a:ext cx="778647" cy="1788251"/>
+          </a:xfrm>
+          <a:prstGeom prst="straightConnector1">
+            <a:avLst/>
+          </a:prstGeom>
+          <a:ln>
+            <a:tailEnd type="arrow"/>
+          </a:ln>
+        </p:spPr>
+        <p:style>
+          <a:lnRef idx="1">
+            <a:schemeClr val="dk1"/>
+          </a:lnRef>
+          <a:fillRef idx="0">
+            <a:schemeClr val="dk1"/>
+          </a:fillRef>
+          <a:effectRef idx="0">
+            <a:schemeClr val="dk1"/>
+          </a:effectRef>
+          <a:fontRef idx="minor">
+            <a:schemeClr val="tx1"/>
+          </a:fontRef>
+        </p:style>
+      </p:cxnSp>
+      <p:cxnSp>
+        <p:nvCxnSpPr>
+          <p:cNvPr id="35" name="Straight Arrow Connector 34"/>
+          <p:cNvCxnSpPr/>
+          <p:nvPr/>
+        </p:nvCxnSpPr>
+        <p:spPr>
+          <a:xfrm flipV="1">
+            <a:off x="1496963" y="2243647"/>
+            <a:ext cx="1706431" cy="1972143"/>
+          </a:xfrm>
+          <a:prstGeom prst="straightConnector1">
+            <a:avLst/>
+          </a:prstGeom>
+          <a:ln>
+            <a:tailEnd type="arrow"/>
+          </a:ln>
+        </p:spPr>
+        <p:style>
+          <a:lnRef idx="1">
+            <a:schemeClr val="dk1"/>
+          </a:lnRef>
+          <a:fillRef idx="0">
+            <a:schemeClr val="dk1"/>
+          </a:fillRef>
+          <a:effectRef idx="0">
+            <a:schemeClr val="dk1"/>
+          </a:effectRef>
+          <a:fontRef idx="minor">
+            <a:schemeClr val="tx1"/>
+          </a:fontRef>
+        </p:style>
+      </p:cxnSp>
+      <p:cxnSp>
+        <p:nvCxnSpPr>
+          <p:cNvPr id="37" name="Straight Arrow Connector 36"/>
+          <p:cNvCxnSpPr/>
+          <p:nvPr/>
+        </p:nvCxnSpPr>
+        <p:spPr>
+          <a:xfrm flipV="1">
+            <a:off x="1588905" y="2234132"/>
+            <a:ext cx="4118895" cy="2062282"/>
+          </a:xfrm>
+          <a:prstGeom prst="straightConnector1">
+            <a:avLst/>
+          </a:prstGeom>
+          <a:ln>
+            <a:tailEnd type="arrow"/>
+          </a:ln>
+        </p:spPr>
+        <p:style>
+          <a:lnRef idx="1">
+            <a:schemeClr val="dk1"/>
+          </a:lnRef>
+          <a:fillRef idx="0">
+            <a:schemeClr val="dk1"/>
+          </a:fillRef>
+          <a:effectRef idx="0">
+            <a:schemeClr val="dk1"/>
+          </a:effectRef>
+          <a:fontRef idx="minor">
+            <a:schemeClr val="tx1"/>
+          </a:fontRef>
+        </p:style>
+      </p:cxnSp>
+      <p:cxnSp>
+        <p:nvCxnSpPr>
+          <p:cNvPr id="50" name="Straight Arrow Connector 49"/>
+          <p:cNvCxnSpPr/>
+          <p:nvPr/>
+        </p:nvCxnSpPr>
+        <p:spPr>
+          <a:xfrm flipV="1">
+            <a:off x="2318120" y="2396048"/>
+            <a:ext cx="0" cy="1720741"/>
+          </a:xfrm>
+          <a:prstGeom prst="straightConnector1">
+            <a:avLst/>
+          </a:prstGeom>
+          <a:ln>
+            <a:tailEnd type="arrow"/>
+          </a:ln>
+        </p:spPr>
+        <p:style>
+          <a:lnRef idx="1">
+            <a:schemeClr val="dk1"/>
+          </a:lnRef>
+          <a:fillRef idx="0">
+            <a:schemeClr val="dk1"/>
+          </a:fillRef>
+          <a:effectRef idx="0">
+            <a:schemeClr val="dk1"/>
+          </a:effectRef>
+          <a:fontRef idx="minor">
+            <a:schemeClr val="tx1"/>
+          </a:fontRef>
+        </p:style>
+      </p:cxnSp>
+      <p:cxnSp>
+        <p:nvCxnSpPr>
+          <p:cNvPr id="54" name="Straight Arrow Connector 53"/>
+          <p:cNvCxnSpPr/>
+          <p:nvPr/>
+        </p:nvCxnSpPr>
+        <p:spPr>
+          <a:xfrm flipV="1">
+            <a:off x="2586060" y="2355736"/>
+            <a:ext cx="800413" cy="1740898"/>
+          </a:xfrm>
+          <a:prstGeom prst="straightConnector1">
+            <a:avLst/>
+          </a:prstGeom>
+          <a:ln>
+            <a:tailEnd type="arrow"/>
+          </a:ln>
+        </p:spPr>
+        <p:style>
+          <a:lnRef idx="1">
+            <a:schemeClr val="dk1"/>
+          </a:lnRef>
+          <a:fillRef idx="0">
+            <a:schemeClr val="dk1"/>
+          </a:fillRef>
+          <a:effectRef idx="0">
+            <a:schemeClr val="dk1"/>
+          </a:effectRef>
+          <a:fontRef idx="minor">
+            <a:schemeClr val="tx1"/>
+          </a:fontRef>
+        </p:style>
+      </p:cxnSp>
+      <p:cxnSp>
+        <p:nvCxnSpPr>
+          <p:cNvPr id="57" name="Straight Arrow Connector 56"/>
+          <p:cNvCxnSpPr/>
+          <p:nvPr/>
+        </p:nvCxnSpPr>
+        <p:spPr>
+          <a:xfrm flipV="1">
+            <a:off x="2829837" y="2355736"/>
+            <a:ext cx="2969889" cy="1900366"/>
+          </a:xfrm>
+          <a:prstGeom prst="straightConnector1">
+            <a:avLst/>
+          </a:prstGeom>
+          <a:ln>
+            <a:tailEnd type="arrow"/>
+          </a:ln>
+        </p:spPr>
+        <p:style>
+          <a:lnRef idx="1">
+            <a:schemeClr val="dk1"/>
+          </a:lnRef>
+          <a:fillRef idx="0">
+            <a:schemeClr val="dk1"/>
+          </a:fillRef>
+          <a:effectRef idx="0">
+            <a:schemeClr val="dk1"/>
+          </a:effectRef>
+          <a:fontRef idx="minor">
+            <a:schemeClr val="tx1"/>
+          </a:fontRef>
+        </p:style>
+      </p:cxnSp>
+      <p:cxnSp>
+        <p:nvCxnSpPr>
+          <p:cNvPr id="62" name="Straight Arrow Connector 61"/>
+          <p:cNvCxnSpPr/>
+          <p:nvPr/>
+        </p:nvCxnSpPr>
+        <p:spPr>
+          <a:xfrm flipH="1" flipV="1">
+            <a:off x="2510836" y="2315425"/>
+            <a:ext cx="910028" cy="1862513"/>
+          </a:xfrm>
+          <a:prstGeom prst="straightConnector1">
+            <a:avLst/>
+          </a:prstGeom>
+          <a:ln>
+            <a:tailEnd type="arrow"/>
+          </a:ln>
+        </p:spPr>
+        <p:style>
+          <a:lnRef idx="1">
+            <a:schemeClr val="dk1"/>
+          </a:lnRef>
+          <a:fillRef idx="0">
+            <a:schemeClr val="dk1"/>
+          </a:fillRef>
+          <a:effectRef idx="0">
+            <a:schemeClr val="dk1"/>
+          </a:effectRef>
+          <a:fontRef idx="minor">
+            <a:schemeClr val="tx1"/>
+          </a:fontRef>
+        </p:style>
+      </p:cxnSp>
+      <p:cxnSp>
+        <p:nvCxnSpPr>
+          <p:cNvPr id="66" name="Straight Arrow Connector 65"/>
+          <p:cNvCxnSpPr/>
+          <p:nvPr/>
+        </p:nvCxnSpPr>
+        <p:spPr>
+          <a:xfrm flipH="1" flipV="1">
+            <a:off x="3542850" y="2355749"/>
+            <a:ext cx="30414" cy="1740885"/>
+          </a:xfrm>
+          <a:prstGeom prst="straightConnector1">
+            <a:avLst/>
+          </a:prstGeom>
+          <a:ln>
+            <a:tailEnd type="arrow"/>
+          </a:ln>
+        </p:spPr>
+        <p:style>
+          <a:lnRef idx="1">
+            <a:schemeClr val="dk1"/>
+          </a:lnRef>
+          <a:fillRef idx="0">
+            <a:schemeClr val="dk1"/>
+          </a:fillRef>
+          <a:effectRef idx="0">
+            <a:schemeClr val="dk1"/>
+          </a:effectRef>
+          <a:fontRef idx="minor">
+            <a:schemeClr val="tx1"/>
+          </a:fontRef>
+        </p:style>
+      </p:cxnSp>
+      <p:cxnSp>
+        <p:nvCxnSpPr>
+          <p:cNvPr id="73" name="Straight Arrow Connector 72"/>
+          <p:cNvCxnSpPr/>
+          <p:nvPr/>
+        </p:nvCxnSpPr>
+        <p:spPr>
+          <a:xfrm flipV="1">
+            <a:off x="3974247" y="2396048"/>
+            <a:ext cx="1957721" cy="1788266"/>
+          </a:xfrm>
+          <a:prstGeom prst="straightConnector1">
+            <a:avLst/>
+          </a:prstGeom>
+          <a:ln>
+            <a:tailEnd type="arrow"/>
+          </a:ln>
+        </p:spPr>
+        <p:style>
+          <a:lnRef idx="1">
+            <a:schemeClr val="dk1"/>
+          </a:lnRef>
+          <a:fillRef idx="0">
+            <a:schemeClr val="dk1"/>
+          </a:fillRef>
+          <a:effectRef idx="0">
+            <a:schemeClr val="dk1"/>
+          </a:effectRef>
+          <a:fontRef idx="minor">
+            <a:schemeClr val="tx1"/>
+          </a:fontRef>
+        </p:style>
+      </p:cxnSp>
+      <p:cxnSp>
+        <p:nvCxnSpPr>
+          <p:cNvPr id="76" name="Straight Arrow Connector 75"/>
+          <p:cNvCxnSpPr/>
+          <p:nvPr/>
+        </p:nvCxnSpPr>
+        <p:spPr>
+          <a:xfrm flipH="1" flipV="1">
+            <a:off x="3695250" y="2355749"/>
+            <a:ext cx="1060150" cy="1740885"/>
+          </a:xfrm>
+          <a:prstGeom prst="straightConnector1">
+            <a:avLst/>
+          </a:prstGeom>
+          <a:ln>
+            <a:tailEnd type="arrow"/>
+          </a:ln>
+        </p:spPr>
+        <p:style>
+          <a:lnRef idx="1">
+            <a:schemeClr val="dk1"/>
+          </a:lnRef>
+          <a:fillRef idx="0">
+            <a:schemeClr val="dk1"/>
+          </a:fillRef>
+          <a:effectRef idx="0">
+            <a:schemeClr val="dk1"/>
+          </a:effectRef>
+          <a:fontRef idx="minor">
+            <a:schemeClr val="tx1"/>
+          </a:fontRef>
+        </p:style>
+      </p:cxnSp>
+      <p:cxnSp>
+        <p:nvCxnSpPr>
+          <p:cNvPr id="79" name="Straight Arrow Connector 78"/>
+          <p:cNvCxnSpPr/>
+          <p:nvPr/>
+        </p:nvCxnSpPr>
+        <p:spPr>
+          <a:xfrm flipH="1" flipV="1">
+            <a:off x="2646535" y="2254957"/>
+            <a:ext cx="1960936" cy="1983449"/>
+          </a:xfrm>
+          <a:prstGeom prst="straightConnector1">
+            <a:avLst/>
+          </a:prstGeom>
+          <a:ln>
+            <a:tailEnd type="arrow"/>
+          </a:ln>
+        </p:spPr>
+        <p:style>
+          <a:lnRef idx="1">
+            <a:schemeClr val="dk1"/>
+          </a:lnRef>
+          <a:fillRef idx="0">
+            <a:schemeClr val="dk1"/>
+          </a:fillRef>
+          <a:effectRef idx="0">
+            <a:schemeClr val="dk1"/>
+          </a:effectRef>
+          <a:fontRef idx="minor">
+            <a:schemeClr val="tx1"/>
+          </a:fontRef>
+        </p:style>
+      </p:cxnSp>
+      <p:cxnSp>
+        <p:nvCxnSpPr>
+          <p:cNvPr id="83" name="Straight Arrow Connector 82"/>
+          <p:cNvCxnSpPr/>
+          <p:nvPr/>
+        </p:nvCxnSpPr>
+        <p:spPr>
+          <a:xfrm flipV="1">
+            <a:off x="5099871" y="2396048"/>
+            <a:ext cx="913252" cy="1680432"/>
+          </a:xfrm>
+          <a:prstGeom prst="straightConnector1">
+            <a:avLst/>
+          </a:prstGeom>
+          <a:ln>
+            <a:tailEnd type="arrow"/>
+          </a:ln>
+        </p:spPr>
+        <p:style>
+          <a:lnRef idx="1">
+            <a:schemeClr val="dk1"/>
+          </a:lnRef>
+          <a:fillRef idx="0">
+            <a:schemeClr val="dk1"/>
+          </a:fillRef>
+          <a:effectRef idx="0">
+            <a:schemeClr val="dk1"/>
+          </a:effectRef>
+          <a:fontRef idx="minor">
+            <a:schemeClr val="tx1"/>
+          </a:fontRef>
+        </p:style>
+      </p:cxnSp>
+      <p:cxnSp>
+        <p:nvCxnSpPr>
+          <p:cNvPr id="91" name="Straight Arrow Connector 90"/>
+          <p:cNvCxnSpPr/>
+          <p:nvPr/>
+        </p:nvCxnSpPr>
+        <p:spPr>
+          <a:xfrm flipH="1" flipV="1">
+            <a:off x="2707009" y="2173666"/>
+            <a:ext cx="4333084" cy="2122748"/>
+          </a:xfrm>
+          <a:prstGeom prst="straightConnector1">
+            <a:avLst/>
+          </a:prstGeom>
+          <a:ln>
+            <a:tailEnd type="arrow"/>
+          </a:ln>
+        </p:spPr>
+        <p:style>
+          <a:lnRef idx="1">
+            <a:schemeClr val="dk1"/>
+          </a:lnRef>
+          <a:fillRef idx="0">
+            <a:schemeClr val="dk1"/>
+          </a:fillRef>
+          <a:effectRef idx="0">
+            <a:schemeClr val="dk1"/>
+          </a:effectRef>
+          <a:fontRef idx="minor">
+            <a:schemeClr val="tx1"/>
+          </a:fontRef>
+        </p:style>
+      </p:cxnSp>
+      <p:cxnSp>
+        <p:nvCxnSpPr>
+          <p:cNvPr id="95" name="Straight Arrow Connector 94"/>
+          <p:cNvCxnSpPr/>
+          <p:nvPr/>
+        </p:nvCxnSpPr>
+        <p:spPr>
+          <a:xfrm flipH="1" flipV="1">
+            <a:off x="3922621" y="2263803"/>
+            <a:ext cx="3177946" cy="1933610"/>
+          </a:xfrm>
+          <a:prstGeom prst="straightConnector1">
+            <a:avLst/>
+          </a:prstGeom>
+          <a:ln>
+            <a:tailEnd type="arrow"/>
+          </a:ln>
+        </p:spPr>
+        <p:style>
+          <a:lnRef idx="1">
+            <a:schemeClr val="dk1"/>
+          </a:lnRef>
+          <a:fillRef idx="0">
+            <a:schemeClr val="dk1"/>
+          </a:fillRef>
+          <a:effectRef idx="0">
+            <a:schemeClr val="dk1"/>
+          </a:effectRef>
+          <a:fontRef idx="minor">
+            <a:schemeClr val="tx1"/>
+          </a:fontRef>
+        </p:style>
+      </p:cxnSp>
+      <p:cxnSp>
+        <p:nvCxnSpPr>
+          <p:cNvPr id="99" name="Straight Arrow Connector 98"/>
+          <p:cNvCxnSpPr/>
+          <p:nvPr/>
+        </p:nvCxnSpPr>
+        <p:spPr>
+          <a:xfrm flipH="1" flipV="1">
+            <a:off x="6351548" y="2335593"/>
+            <a:ext cx="864309" cy="1770568"/>
+          </a:xfrm>
+          <a:prstGeom prst="straightConnector1">
+            <a:avLst/>
+          </a:prstGeom>
+          <a:ln>
+            <a:tailEnd type="arrow"/>
+          </a:ln>
+        </p:spPr>
+        <p:style>
+          <a:lnRef idx="1">
+            <a:schemeClr val="dk1"/>
+          </a:lnRef>
+          <a:fillRef idx="0">
+            <a:schemeClr val="dk1"/>
+          </a:fillRef>
+          <a:effectRef idx="0">
+            <a:schemeClr val="dk1"/>
+          </a:effectRef>
+          <a:fontRef idx="minor">
+            <a:schemeClr val="tx1"/>
+          </a:fontRef>
+        </p:style>
+      </p:cxnSp>
+      <p:sp>
+        <p:nvSpPr>
+          <p:cNvPr id="101" name="Rectangle 100"/>
+          <p:cNvSpPr/>
+          <p:nvPr/>
+        </p:nvSpPr>
+        <p:spPr>
+          <a:xfrm>
+            <a:off x="1588905" y="1310125"/>
+            <a:ext cx="5143733" cy="1269813"/>
+          </a:xfrm>
+          <a:prstGeom prst="rect">
+            <a:avLst/>
+          </a:prstGeom>
+          <a:noFill/>
+          <a:ln/>
+        </p:spPr>
+        <p:style>
+          <a:lnRef idx="2">
+            <a:schemeClr val="dk1"/>
+          </a:lnRef>
+          <a:fillRef idx="1">
+            <a:schemeClr val="lt1"/>
+          </a:fillRef>
+          <a:effectRef idx="0">
+            <a:schemeClr val="dk1"/>
+          </a:effectRef>
+          <a:fontRef idx="minor">
+            <a:schemeClr val="dk1"/>
+          </a:fontRef>
+        </p:style>
+        <p:txBody>
+          <a:bodyPr rtlCol="0" anchor="ctr"/>
+          <a:lstStyle/>
+          <a:p>
+            <a:pPr algn="ctr"/>
+            <a:endParaRPr lang="en-US"/>
+          </a:p>
+        </p:txBody>
+      </p:sp>
+      <p:cxnSp>
+        <p:nvCxnSpPr>
+          <p:cNvPr id="102" name="Straight Arrow Connector 101"/>
+          <p:cNvCxnSpPr/>
+          <p:nvPr/>
+        </p:nvCxnSpPr>
+        <p:spPr>
+          <a:xfrm flipV="1">
+            <a:off x="2257646" y="851700"/>
+            <a:ext cx="0" cy="591423"/>
+          </a:xfrm>
+          <a:prstGeom prst="straightConnector1">
+            <a:avLst/>
+          </a:prstGeom>
+          <a:ln>
+            <a:tailEnd type="arrow"/>
+          </a:ln>
+        </p:spPr>
+        <p:style>
+          <a:lnRef idx="1">
+            <a:schemeClr val="dk1"/>
+          </a:lnRef>
+          <a:fillRef idx="0">
+            <a:schemeClr val="dk1"/>
+          </a:fillRef>
+          <a:effectRef idx="0">
+            <a:schemeClr val="dk1"/>
+          </a:effectRef>
+          <a:fontRef idx="minor">
+            <a:schemeClr val="tx1"/>
+          </a:fontRef>
+        </p:style>
+      </p:cxnSp>
+      <p:cxnSp>
+        <p:nvCxnSpPr>
+          <p:cNvPr id="103" name="Straight Arrow Connector 102"/>
+          <p:cNvCxnSpPr/>
+          <p:nvPr/>
+        </p:nvCxnSpPr>
+        <p:spPr>
+          <a:xfrm flipV="1">
+            <a:off x="3532948" y="851700"/>
+            <a:ext cx="0" cy="591423"/>
+          </a:xfrm>
+          <a:prstGeom prst="straightConnector1">
+            <a:avLst/>
+          </a:prstGeom>
+          <a:ln>
+            <a:tailEnd type="arrow"/>
+          </a:ln>
+        </p:spPr>
+        <p:style>
+          <a:lnRef idx="1">
+            <a:schemeClr val="dk1"/>
+          </a:lnRef>
+          <a:fillRef idx="0">
+            <a:schemeClr val="dk1"/>
+          </a:fillRef>
+          <a:effectRef idx="0">
+            <a:schemeClr val="dk1"/>
+          </a:effectRef>
+          <a:fontRef idx="minor">
+            <a:schemeClr val="tx1"/>
+          </a:fontRef>
+        </p:style>
+      </p:cxnSp>
+      <p:cxnSp>
+        <p:nvCxnSpPr>
+          <p:cNvPr id="104" name="Straight Arrow Connector 103"/>
+          <p:cNvCxnSpPr/>
+          <p:nvPr/>
+        </p:nvCxnSpPr>
+        <p:spPr>
+          <a:xfrm flipV="1">
+            <a:off x="6055353" y="861215"/>
+            <a:ext cx="0" cy="591423"/>
+          </a:xfrm>
+          <a:prstGeom prst="straightConnector1">
+            <a:avLst/>
+          </a:prstGeom>
+          <a:ln>
+            <a:tailEnd type="arrow"/>
+          </a:ln>
+        </p:spPr>
+        <p:style>
+          <a:lnRef idx="1">
+            <a:schemeClr val="dk1"/>
+          </a:lnRef>
+          <a:fillRef idx="0">
+            <a:schemeClr val="dk1"/>
+          </a:fillRef>
+          <a:effectRef idx="0">
+            <a:schemeClr val="dk1"/>
+          </a:effectRef>
+          <a:fontRef idx="minor">
+            <a:schemeClr val="tx1"/>
+          </a:fontRef>
+        </p:style>
+      </p:cxnSp>
+      <p:sp>
+        <p:nvSpPr>
+          <p:cNvPr id="110" name="TextBox 109"/>
+          <p:cNvSpPr txBox="1"/>
+          <p:nvPr/>
+        </p:nvSpPr>
+        <p:spPr>
+          <a:xfrm>
+            <a:off x="6732638" y="1617472"/>
+            <a:ext cx="992579" cy="646331"/>
+          </a:xfrm>
+          <a:prstGeom prst="rect">
+            <a:avLst/>
+          </a:prstGeom>
+          <a:noFill/>
+        </p:spPr>
+        <p:txBody>
+          <a:bodyPr wrap="none" rtlCol="0">
+            <a:spAutoFit/>
+          </a:bodyPr>
+          <a:lstStyle/>
+          <a:p>
+            <a:pPr algn="ctr"/>
+            <a:r>
+              <a:rPr lang="en-US" dirty="0" smtClean="0">
+                <a:latin typeface="Cambria"/>
+                <a:cs typeface="Cambria"/>
+              </a:rPr>
+              <a:t>10-way </a:t>
+            </a:r>
+          </a:p>
+          <a:p>
+            <a:pPr algn="ctr"/>
+            <a:r>
+              <a:rPr lang="en-US" dirty="0" smtClean="0">
+                <a:latin typeface="Cambria"/>
+                <a:cs typeface="Cambria"/>
+              </a:rPr>
+              <a:t>Softmax</a:t>
+            </a:r>
+            <a:endParaRPr lang="en-US" dirty="0">
+              <a:latin typeface="Cambria"/>
+              <a:cs typeface="Cambria"/>
+            </a:endParaRPr>
+          </a:p>
+        </p:txBody>
+      </p:sp>
+      <p:sp>
+        <p:nvSpPr>
+          <p:cNvPr id="111" name="TextBox 110"/>
+          <p:cNvSpPr txBox="1"/>
+          <p:nvPr/>
+        </p:nvSpPr>
+        <p:spPr>
+          <a:xfrm>
+            <a:off x="8064515" y="4233457"/>
+            <a:ext cx="909173" cy="646331"/>
+          </a:xfrm>
+          <a:prstGeom prst="rect">
+            <a:avLst/>
+          </a:prstGeom>
+          <a:noFill/>
+        </p:spPr>
+        <p:txBody>
+          <a:bodyPr wrap="none" rtlCol="0">
+            <a:spAutoFit/>
+          </a:bodyPr>
+          <a:lstStyle/>
+          <a:p>
+            <a:pPr algn="ctr"/>
+            <a:r>
+              <a:rPr lang="en-US" dirty="0" smtClean="0">
+                <a:latin typeface="Cambria"/>
+                <a:cs typeface="Cambria"/>
+              </a:rPr>
+              <a:t>28 x 28</a:t>
+            </a:r>
+          </a:p>
+          <a:p>
+            <a:pPr algn="ctr"/>
+            <a:r>
+              <a:rPr lang="en-US" dirty="0" smtClean="0">
+                <a:latin typeface="Cambria"/>
+                <a:cs typeface="Cambria"/>
+              </a:rPr>
+              <a:t>inputs</a:t>
+            </a:r>
             <a:endParaRPr lang="en-US" dirty="0">
               <a:latin typeface="Cambria"/>
               <a:cs typeface="Cambria"/>
@@ -11696,7 +14414,7 @@
     </p:spTree>
     <p:extLst>
       <p:ext uri="{BB962C8B-B14F-4D97-AF65-F5344CB8AC3E}">
-        <p14:creationId xmlns:p14="http://schemas.microsoft.com/office/powerpoint/2010/main" val="4237863019"/>
+        <p14:creationId xmlns:p14="http://schemas.microsoft.com/office/powerpoint/2010/main" val="549103925"/>
       </p:ext>
     </p:extLst>
   </p:cSld>
@@ -11769,7 +14487,7 @@
           <a:graphicData uri="http://schemas.openxmlformats.org/presentationml/2006/ole">
             <mc:AlternateContent xmlns:mc="http://schemas.openxmlformats.org/markup-compatibility/2006">
               <mc:Choice xmlns:v="urn:schemas-microsoft-com:vml" Requires="v">
-                <p:oleObj spid="_x0000_s2079" name="Equation" r:id="rId4" imgW="127000" imgH="165100" progId="Equation.3">
+                <p:oleObj spid="_x0000_s2105" name="Equation" r:id="rId4" imgW="127000" imgH="165100" progId="Equation.3">
                   <p:embed/>
                 </p:oleObj>
               </mc:Choice>
@@ -11826,7 +14544,7 @@
           <a:graphicData uri="http://schemas.openxmlformats.org/presentationml/2006/ole">
             <mc:AlternateContent xmlns:mc="http://schemas.openxmlformats.org/markup-compatibility/2006">
               <mc:Choice xmlns:v="urn:schemas-microsoft-com:vml" Requires="v">
-                <p:oleObj spid="_x0000_s2080" name="Equation" r:id="rId6" imgW="114300" imgH="139700" progId="Equation.3">
+                <p:oleObj spid="_x0000_s2106" name="Equation" r:id="rId6" imgW="114300" imgH="139700" progId="Equation.3">
                   <p:embed/>
                 </p:oleObj>
               </mc:Choice>
@@ -11883,7 +14601,7 @@
           <a:graphicData uri="http://schemas.openxmlformats.org/presentationml/2006/ole">
             <mc:AlternateContent xmlns:mc="http://schemas.openxmlformats.org/markup-compatibility/2006">
               <mc:Choice xmlns:v="urn:schemas-microsoft-com:vml" Requires="v">
-                <p:oleObj spid="_x0000_s2081" name="Equation" r:id="rId8" imgW="1574800" imgH="215900" progId="Equation.3">
+                <p:oleObj spid="_x0000_s2107" name="Equation" r:id="rId8" imgW="1574800" imgH="215900" progId="Equation.3">
                   <p:embed/>
                 </p:oleObj>
               </mc:Choice>
@@ -11940,7 +14658,7 @@
           <a:graphicData uri="http://schemas.openxmlformats.org/presentationml/2006/ole">
             <mc:AlternateContent xmlns:mc="http://schemas.openxmlformats.org/markup-compatibility/2006">
               <mc:Choice xmlns:v="urn:schemas-microsoft-com:vml" Requires="v">
-                <p:oleObj spid="_x0000_s2082" name="Equation" r:id="rId10" imgW="647700" imgH="393700" progId="Equation.3">
+                <p:oleObj spid="_x0000_s2108" name="Equation" r:id="rId10" imgW="647700" imgH="393700" progId="Equation.3">
                   <p:embed/>
                 </p:oleObj>
               </mc:Choice>
@@ -13275,7 +15993,7 @@
           <a:graphicData uri="http://schemas.openxmlformats.org/presentationml/2006/ole">
             <mc:AlternateContent xmlns:mc="http://schemas.openxmlformats.org/markup-compatibility/2006">
               <mc:Choice xmlns:v="urn:schemas-microsoft-com:vml" Requires="v">
-                <p:oleObj spid="_x0000_s3453" name="Equation" r:id="rId3" imgW="254000" imgH="241300" progId="Equation.3">
+                <p:oleObj spid="_x0000_s3575" name="Equation" r:id="rId3" imgW="254000" imgH="241300" progId="Equation.3">
                   <p:embed/>
                 </p:oleObj>
               </mc:Choice>
@@ -13424,7 +16142,7 @@
           <a:graphicData uri="http://schemas.openxmlformats.org/presentationml/2006/ole">
             <mc:AlternateContent xmlns:mc="http://schemas.openxmlformats.org/markup-compatibility/2006">
               <mc:Choice xmlns:v="urn:schemas-microsoft-com:vml" Requires="v">
-                <p:oleObj spid="_x0000_s3454" name="Equation" r:id="rId5" imgW="254000" imgH="241300" progId="Equation.3">
+                <p:oleObj spid="_x0000_s3576" name="Equation" r:id="rId5" imgW="254000" imgH="241300" progId="Equation.3">
                   <p:embed/>
                 </p:oleObj>
               </mc:Choice>
@@ -13528,7 +16246,7 @@
           <a:graphicData uri="http://schemas.openxmlformats.org/presentationml/2006/ole">
             <mc:AlternateContent xmlns:mc="http://schemas.openxmlformats.org/markup-compatibility/2006">
               <mc:Choice xmlns:v="urn:schemas-microsoft-com:vml" Requires="v">
-                <p:oleObj spid="_x0000_s3455" name="Equation" r:id="rId7" imgW="254000" imgH="241300" progId="Equation.3">
+                <p:oleObj spid="_x0000_s3577" name="Equation" r:id="rId7" imgW="254000" imgH="241300" progId="Equation.3">
                   <p:embed/>
                 </p:oleObj>
               </mc:Choice>
@@ -13632,7 +16350,7 @@
           <a:graphicData uri="http://schemas.openxmlformats.org/presentationml/2006/ole">
             <mc:AlternateContent xmlns:mc="http://schemas.openxmlformats.org/markup-compatibility/2006">
               <mc:Choice xmlns:v="urn:schemas-microsoft-com:vml" Requires="v">
-                <p:oleObj spid="_x0000_s3456" name="Equation" r:id="rId9" imgW="266700" imgH="241300" progId="Equation.3">
+                <p:oleObj spid="_x0000_s3578" name="Equation" r:id="rId9" imgW="266700" imgH="241300" progId="Equation.3">
                   <p:embed/>
                 </p:oleObj>
               </mc:Choice>
@@ -13736,7 +16454,7 @@
           <a:graphicData uri="http://schemas.openxmlformats.org/presentationml/2006/ole">
             <mc:AlternateContent xmlns:mc="http://schemas.openxmlformats.org/markup-compatibility/2006">
               <mc:Choice xmlns:v="urn:schemas-microsoft-com:vml" Requires="v">
-                <p:oleObj spid="_x0000_s3457" name="Equation" r:id="rId11" imgW="266700" imgH="241300" progId="Equation.3">
+                <p:oleObj spid="_x0000_s3579" name="Equation" r:id="rId11" imgW="266700" imgH="241300" progId="Equation.3">
                   <p:embed/>
                 </p:oleObj>
               </mc:Choice>
@@ -13840,7 +16558,7 @@
           <a:graphicData uri="http://schemas.openxmlformats.org/presentationml/2006/ole">
             <mc:AlternateContent xmlns:mc="http://schemas.openxmlformats.org/markup-compatibility/2006">
               <mc:Choice xmlns:v="urn:schemas-microsoft-com:vml" Requires="v">
-                <p:oleObj spid="_x0000_s3458" name="Equation" r:id="rId13" imgW="254000" imgH="241300" progId="Equation.3">
+                <p:oleObj spid="_x0000_s3580" name="Equation" r:id="rId13" imgW="254000" imgH="241300" progId="Equation.3">
                   <p:embed/>
                 </p:oleObj>
               </mc:Choice>
@@ -13989,7 +16707,7 @@
           <a:graphicData uri="http://schemas.openxmlformats.org/presentationml/2006/ole">
             <mc:AlternateContent xmlns:mc="http://schemas.openxmlformats.org/markup-compatibility/2006">
               <mc:Choice xmlns:v="urn:schemas-microsoft-com:vml" Requires="v">
-                <p:oleObj spid="_x0000_s3459" name="Equation" r:id="rId15" imgW="266700" imgH="241300" progId="Equation.3">
+                <p:oleObj spid="_x0000_s3581" name="Equation" r:id="rId15" imgW="266700" imgH="241300" progId="Equation.3">
                   <p:embed/>
                 </p:oleObj>
               </mc:Choice>
@@ -14048,7 +16766,7 @@
           <a:graphicData uri="http://schemas.openxmlformats.org/presentationml/2006/ole">
             <mc:AlternateContent xmlns:mc="http://schemas.openxmlformats.org/markup-compatibility/2006">
               <mc:Choice xmlns:v="urn:schemas-microsoft-com:vml" Requires="v">
-                <p:oleObj spid="_x0000_s3460" name="Equation" r:id="rId17" imgW="254000" imgH="241300" progId="Equation.3">
+                <p:oleObj spid="_x0000_s3582" name="Equation" r:id="rId17" imgW="254000" imgH="241300" progId="Equation.3">
                   <p:embed/>
                 </p:oleObj>
               </mc:Choice>
@@ -14107,7 +16825,7 @@
           <a:graphicData uri="http://schemas.openxmlformats.org/presentationml/2006/ole">
             <mc:AlternateContent xmlns:mc="http://schemas.openxmlformats.org/markup-compatibility/2006">
               <mc:Choice xmlns:v="urn:schemas-microsoft-com:vml" Requires="v">
-                <p:oleObj spid="_x0000_s3461" name="Equation" r:id="rId19" imgW="254000" imgH="241300" progId="Equation.3">
+                <p:oleObj spid="_x0000_s3583" name="Equation" r:id="rId19" imgW="254000" imgH="241300" progId="Equation.3">
                   <p:embed/>
                 </p:oleObj>
               </mc:Choice>
@@ -14211,7 +16929,7 @@
           <a:graphicData uri="http://schemas.openxmlformats.org/presentationml/2006/ole">
             <mc:AlternateContent xmlns:mc="http://schemas.openxmlformats.org/markup-compatibility/2006">
               <mc:Choice xmlns:v="urn:schemas-microsoft-com:vml" Requires="v">
-                <p:oleObj spid="_x0000_s3462" name="Equation" r:id="rId21" imgW="279400" imgH="241300" progId="Equation.3">
+                <p:oleObj spid="_x0000_s3584" name="Equation" r:id="rId21" imgW="279400" imgH="241300" progId="Equation.3">
                   <p:embed/>
                 </p:oleObj>
               </mc:Choice>
@@ -14360,7 +17078,7 @@
           <a:graphicData uri="http://schemas.openxmlformats.org/presentationml/2006/ole">
             <mc:AlternateContent xmlns:mc="http://schemas.openxmlformats.org/markup-compatibility/2006">
               <mc:Choice xmlns:v="urn:schemas-microsoft-com:vml" Requires="v">
-                <p:oleObj spid="_x0000_s3463" name="Equation" r:id="rId23" imgW="279400" imgH="241300" progId="Equation.3">
+                <p:oleObj spid="_x0000_s3585" name="Equation" r:id="rId23" imgW="279400" imgH="241300" progId="Equation.3">
                   <p:embed/>
                 </p:oleObj>
               </mc:Choice>
@@ -14464,7 +17182,7 @@
           <a:graphicData uri="http://schemas.openxmlformats.org/presentationml/2006/ole">
             <mc:AlternateContent xmlns:mc="http://schemas.openxmlformats.org/markup-compatibility/2006">
               <mc:Choice xmlns:v="urn:schemas-microsoft-com:vml" Requires="v">
-                <p:oleObj spid="_x0000_s3464" name="Equation" r:id="rId25" imgW="279400" imgH="241300" progId="Equation.3">
+                <p:oleObj spid="_x0000_s3586" name="Equation" r:id="rId25" imgW="279400" imgH="241300" progId="Equation.3">
                   <p:embed/>
                 </p:oleObj>
               </mc:Choice>
@@ -14568,7 +17286,7 @@
           <a:graphicData uri="http://schemas.openxmlformats.org/presentationml/2006/ole">
             <mc:AlternateContent xmlns:mc="http://schemas.openxmlformats.org/markup-compatibility/2006">
               <mc:Choice xmlns:v="urn:schemas-microsoft-com:vml" Requires="v">
-                <p:oleObj spid="_x0000_s3465" name="Equation" r:id="rId27" imgW="279400" imgH="241300" progId="Equation.3">
+                <p:oleObj spid="_x0000_s3587" name="Equation" r:id="rId27" imgW="279400" imgH="241300" progId="Equation.3">
                   <p:embed/>
                 </p:oleObj>
               </mc:Choice>
@@ -14672,7 +17390,7 @@
           <a:graphicData uri="http://schemas.openxmlformats.org/presentationml/2006/ole">
             <mc:AlternateContent xmlns:mc="http://schemas.openxmlformats.org/markup-compatibility/2006">
               <mc:Choice xmlns:v="urn:schemas-microsoft-com:vml" Requires="v">
-                <p:oleObj spid="_x0000_s3466" name="Equation" r:id="rId29" imgW="279400" imgH="241300" progId="Equation.3">
+                <p:oleObj spid="_x0000_s3588" name="Equation" r:id="rId29" imgW="279400" imgH="241300" progId="Equation.3">
                   <p:embed/>
                 </p:oleObj>
               </mc:Choice>
@@ -14776,7 +17494,7 @@
           <a:graphicData uri="http://schemas.openxmlformats.org/presentationml/2006/ole">
             <mc:AlternateContent xmlns:mc="http://schemas.openxmlformats.org/markup-compatibility/2006">
               <mc:Choice xmlns:v="urn:schemas-microsoft-com:vml" Requires="v">
-                <p:oleObj spid="_x0000_s3467" name="Equation" r:id="rId31" imgW="279400" imgH="241300" progId="Equation.3">
+                <p:oleObj spid="_x0000_s3589" name="Equation" r:id="rId31" imgW="279400" imgH="241300" progId="Equation.3">
                   <p:embed/>
                 </p:oleObj>
               </mc:Choice>
@@ -14925,7 +17643,7 @@
           <a:graphicData uri="http://schemas.openxmlformats.org/presentationml/2006/ole">
             <mc:AlternateContent xmlns:mc="http://schemas.openxmlformats.org/markup-compatibility/2006">
               <mc:Choice xmlns:v="urn:schemas-microsoft-com:vml" Requires="v">
-                <p:oleObj spid="_x0000_s3468" name="Equation" r:id="rId33" imgW="279400" imgH="241300" progId="Equation.3">
+                <p:oleObj spid="_x0000_s3590" name="Equation" r:id="rId33" imgW="279400" imgH="241300" progId="Equation.3">
                   <p:embed/>
                 </p:oleObj>
               </mc:Choice>
@@ -14984,7 +17702,7 @@
           <a:graphicData uri="http://schemas.openxmlformats.org/presentationml/2006/ole">
             <mc:AlternateContent xmlns:mc="http://schemas.openxmlformats.org/markup-compatibility/2006">
               <mc:Choice xmlns:v="urn:schemas-microsoft-com:vml" Requires="v">
-                <p:oleObj spid="_x0000_s3469" name="Equation" r:id="rId35" imgW="279400" imgH="241300" progId="Equation.3">
+                <p:oleObj spid="_x0000_s3591" name="Equation" r:id="rId35" imgW="279400" imgH="241300" progId="Equation.3">
                   <p:embed/>
                 </p:oleObj>
               </mc:Choice>
@@ -15043,7 +17761,7 @@
           <a:graphicData uri="http://schemas.openxmlformats.org/presentationml/2006/ole">
             <mc:AlternateContent xmlns:mc="http://schemas.openxmlformats.org/markup-compatibility/2006">
               <mc:Choice xmlns:v="urn:schemas-microsoft-com:vml" Requires="v">
-                <p:oleObj spid="_x0000_s3470" name="Equation" r:id="rId37" imgW="279400" imgH="241300" progId="Equation.3">
+                <p:oleObj spid="_x0000_s3592" name="Equation" r:id="rId37" imgW="279400" imgH="241300" progId="Equation.3">
                   <p:embed/>
                 </p:oleObj>
               </mc:Choice>
@@ -15147,7 +17865,7 @@
           <a:graphicData uri="http://schemas.openxmlformats.org/presentationml/2006/ole">
             <mc:AlternateContent xmlns:mc="http://schemas.openxmlformats.org/markup-compatibility/2006">
               <mc:Choice xmlns:v="urn:schemas-microsoft-com:vml" Requires="v">
-                <p:oleObj spid="_x0000_s3471" name="Equation" r:id="rId39" imgW="139700" imgH="228600" progId="Equation.3">
+                <p:oleObj spid="_x0000_s3593" name="Equation" r:id="rId39" imgW="139700" imgH="228600" progId="Equation.3">
                   <p:embed/>
                 </p:oleObj>
               </mc:Choice>
@@ -15296,7 +18014,7 @@
           <a:graphicData uri="http://schemas.openxmlformats.org/presentationml/2006/ole">
             <mc:AlternateContent xmlns:mc="http://schemas.openxmlformats.org/markup-compatibility/2006">
               <mc:Choice xmlns:v="urn:schemas-microsoft-com:vml" Requires="v">
-                <p:oleObj spid="_x0000_s3472" name="Equation" r:id="rId41" imgW="139700" imgH="228600" progId="Equation.3">
+                <p:oleObj spid="_x0000_s3594" name="Equation" r:id="rId41" imgW="139700" imgH="228600" progId="Equation.3">
                   <p:embed/>
                 </p:oleObj>
               </mc:Choice>
@@ -15355,7 +18073,7 @@
           <a:graphicData uri="http://schemas.openxmlformats.org/presentationml/2006/ole">
             <mc:AlternateContent xmlns:mc="http://schemas.openxmlformats.org/markup-compatibility/2006">
               <mc:Choice xmlns:v="urn:schemas-microsoft-com:vml" Requires="v">
-                <p:oleObj spid="_x0000_s3473" name="Equation" r:id="rId43" imgW="139700" imgH="241300" progId="Equation.3">
+                <p:oleObj spid="_x0000_s3595" name="Equation" r:id="rId43" imgW="139700" imgH="241300" progId="Equation.3">
                   <p:embed/>
                 </p:oleObj>
               </mc:Choice>
@@ -15459,7 +18177,7 @@
           <a:graphicData uri="http://schemas.openxmlformats.org/presentationml/2006/ole">
             <mc:AlternateContent xmlns:mc="http://schemas.openxmlformats.org/markup-compatibility/2006">
               <mc:Choice xmlns:v="urn:schemas-microsoft-com:vml" Requires="v">
-                <p:oleObj spid="_x0000_s3474" name="Equation" r:id="rId45" imgW="165100" imgH="228600" progId="Equation.3">
+                <p:oleObj spid="_x0000_s3596" name="Equation" r:id="rId45" imgW="165100" imgH="228600" progId="Equation.3">
                   <p:embed/>
                 </p:oleObj>
               </mc:Choice>
@@ -15608,7 +18326,7 @@
           <a:graphicData uri="http://schemas.openxmlformats.org/presentationml/2006/ole">
             <mc:AlternateContent xmlns:mc="http://schemas.openxmlformats.org/markup-compatibility/2006">
               <mc:Choice xmlns:v="urn:schemas-microsoft-com:vml" Requires="v">
-                <p:oleObj spid="_x0000_s3475" name="Equation" r:id="rId47" imgW="165100" imgH="228600" progId="Equation.3">
+                <p:oleObj spid="_x0000_s3597" name="Equation" r:id="rId47" imgW="165100" imgH="228600" progId="Equation.3">
                   <p:embed/>
                 </p:oleObj>
               </mc:Choice>
@@ -15667,7 +18385,7 @@
           <a:graphicData uri="http://schemas.openxmlformats.org/presentationml/2006/ole">
             <mc:AlternateContent xmlns:mc="http://schemas.openxmlformats.org/markup-compatibility/2006">
               <mc:Choice xmlns:v="urn:schemas-microsoft-com:vml" Requires="v">
-                <p:oleObj spid="_x0000_s3476" name="Equation" r:id="rId49" imgW="165100" imgH="241300" progId="Equation.3">
+                <p:oleObj spid="_x0000_s3598" name="Equation" r:id="rId49" imgW="165100" imgH="241300" progId="Equation.3">
                   <p:embed/>
                 </p:oleObj>
               </mc:Choice>
@@ -15935,7 +18653,7 @@
           <a:graphicData uri="http://schemas.openxmlformats.org/presentationml/2006/ole">
             <mc:AlternateContent xmlns:mc="http://schemas.openxmlformats.org/markup-compatibility/2006">
               <mc:Choice xmlns:v="urn:schemas-microsoft-com:vml" Requires="v">
-                <p:oleObj spid="_x0000_s4229" name="Equation" r:id="rId3" imgW="127000" imgH="165100" progId="Equation.3">
+                <p:oleObj spid="_x0000_s4291" name="Equation" r:id="rId3" imgW="127000" imgH="165100" progId="Equation.3">
                   <p:embed/>
                 </p:oleObj>
               </mc:Choice>
@@ -15992,7 +18710,7 @@
           <a:graphicData uri="http://schemas.openxmlformats.org/presentationml/2006/ole">
             <mc:AlternateContent xmlns:mc="http://schemas.openxmlformats.org/markup-compatibility/2006">
               <mc:Choice xmlns:v="urn:schemas-microsoft-com:vml" Requires="v">
-                <p:oleObj spid="_x0000_s4230" name="Equation" r:id="rId5" imgW="152400" imgH="203200" progId="Equation.3">
+                <p:oleObj spid="_x0000_s4292" name="Equation" r:id="rId5" imgW="152400" imgH="203200" progId="Equation.3">
                   <p:embed/>
                 </p:oleObj>
               </mc:Choice>
@@ -16049,7 +18767,7 @@
           <a:graphicData uri="http://schemas.openxmlformats.org/presentationml/2006/ole">
             <mc:AlternateContent xmlns:mc="http://schemas.openxmlformats.org/markup-compatibility/2006">
               <mc:Choice xmlns:v="urn:schemas-microsoft-com:vml" Requires="v">
-                <p:oleObj spid="_x0000_s4231" name="Equation" r:id="rId7" imgW="177800" imgH="203200" progId="Equation.3">
+                <p:oleObj spid="_x0000_s4293" name="Equation" r:id="rId7" imgW="177800" imgH="203200" progId="Equation.3">
                   <p:embed/>
                 </p:oleObj>
               </mc:Choice>
@@ -16106,7 +18824,7 @@
           <a:graphicData uri="http://schemas.openxmlformats.org/presentationml/2006/ole">
             <mc:AlternateContent xmlns:mc="http://schemas.openxmlformats.org/markup-compatibility/2006">
               <mc:Choice xmlns:v="urn:schemas-microsoft-com:vml" Requires="v">
-                <p:oleObj spid="_x0000_s4232" name="Equation" r:id="rId9" imgW="165100" imgH="215900" progId="Equation.3">
+                <p:oleObj spid="_x0000_s4294" name="Equation" r:id="rId9" imgW="165100" imgH="215900" progId="Equation.3">
                   <p:embed/>
                 </p:oleObj>
               </mc:Choice>
@@ -16163,7 +18881,7 @@
           <a:graphicData uri="http://schemas.openxmlformats.org/presentationml/2006/ole">
             <mc:AlternateContent xmlns:mc="http://schemas.openxmlformats.org/markup-compatibility/2006">
               <mc:Choice xmlns:v="urn:schemas-microsoft-com:vml" Requires="v">
-                <p:oleObj spid="_x0000_s4233" name="Equation" r:id="rId11" imgW="508000" imgH="203200" progId="Equation.3">
+                <p:oleObj spid="_x0000_s4295" name="Equation" r:id="rId11" imgW="508000" imgH="203200" progId="Equation.3">
                   <p:embed/>
                 </p:oleObj>
               </mc:Choice>
@@ -16220,7 +18938,7 @@
           <a:graphicData uri="http://schemas.openxmlformats.org/presentationml/2006/ole">
             <mc:AlternateContent xmlns:mc="http://schemas.openxmlformats.org/markup-compatibility/2006">
               <mc:Choice xmlns:v="urn:schemas-microsoft-com:vml" Requires="v">
-                <p:oleObj spid="_x0000_s4234" name="Equation" r:id="rId13" imgW="317500" imgH="177800" progId="Equation.3">
+                <p:oleObj spid="_x0000_s4296" name="Equation" r:id="rId13" imgW="317500" imgH="177800" progId="Equation.3">
                   <p:embed/>
                 </p:oleObj>
               </mc:Choice>
@@ -16277,7 +18995,7 @@
           <a:graphicData uri="http://schemas.openxmlformats.org/presentationml/2006/ole">
             <mc:AlternateContent xmlns:mc="http://schemas.openxmlformats.org/markup-compatibility/2006">
               <mc:Choice xmlns:v="urn:schemas-microsoft-com:vml" Requires="v">
-                <p:oleObj spid="_x0000_s4235" name="Equation" r:id="rId15" imgW="330200" imgH="177800" progId="Equation.3">
+                <p:oleObj spid="_x0000_s4297" name="Equation" r:id="rId15" imgW="330200" imgH="177800" progId="Equation.3">
                   <p:embed/>
                 </p:oleObj>
               </mc:Choice>
@@ -16334,7 +19052,7 @@
           <a:graphicData uri="http://schemas.openxmlformats.org/presentationml/2006/ole">
             <mc:AlternateContent xmlns:mc="http://schemas.openxmlformats.org/markup-compatibility/2006">
               <mc:Choice xmlns:v="urn:schemas-microsoft-com:vml" Requires="v">
-                <p:oleObj spid="_x0000_s4236" name="Equation" r:id="rId17" imgW="177800" imgH="203200" progId="Equation.3">
+                <p:oleObj spid="_x0000_s4298" name="Equation" r:id="rId17" imgW="177800" imgH="203200" progId="Equation.3">
                   <p:embed/>
                 </p:oleObj>
               </mc:Choice>
@@ -16391,7 +19109,7 @@
           <a:graphicData uri="http://schemas.openxmlformats.org/presentationml/2006/ole">
             <mc:AlternateContent xmlns:mc="http://schemas.openxmlformats.org/markup-compatibility/2006">
               <mc:Choice xmlns:v="urn:schemas-microsoft-com:vml" Requires="v">
-                <p:oleObj spid="_x0000_s4237" name="Equation" r:id="rId19" imgW="203200" imgH="203200" progId="Equation.3">
+                <p:oleObj spid="_x0000_s4299" name="Equation" r:id="rId19" imgW="203200" imgH="203200" progId="Equation.3">
                   <p:embed/>
                 </p:oleObj>
               </mc:Choice>
@@ -16448,7 +19166,7 @@
           <a:graphicData uri="http://schemas.openxmlformats.org/presentationml/2006/ole">
             <mc:AlternateContent xmlns:mc="http://schemas.openxmlformats.org/markup-compatibility/2006">
               <mc:Choice xmlns:v="urn:schemas-microsoft-com:vml" Requires="v">
-                <p:oleObj spid="_x0000_s4238" name="Equation" r:id="rId21" imgW="203200" imgH="203200" progId="Equation.3">
+                <p:oleObj spid="_x0000_s4300" name="Equation" r:id="rId21" imgW="203200" imgH="203200" progId="Equation.3">
                   <p:embed/>
                 </p:oleObj>
               </mc:Choice>
@@ -16505,7 +19223,7 @@
           <a:graphicData uri="http://schemas.openxmlformats.org/presentationml/2006/ole">
             <mc:AlternateContent xmlns:mc="http://schemas.openxmlformats.org/markup-compatibility/2006">
               <mc:Choice xmlns:v="urn:schemas-microsoft-com:vml" Requires="v">
-                <p:oleObj spid="_x0000_s4239" name="Equation" r:id="rId23" imgW="1625600" imgH="241300" progId="Equation.3">
+                <p:oleObj spid="_x0000_s4301" name="Equation" r:id="rId23" imgW="1625600" imgH="241300" progId="Equation.3">
                   <p:embed/>
                 </p:oleObj>
               </mc:Choice>
@@ -16562,7 +19280,7 @@
           <a:graphicData uri="http://schemas.openxmlformats.org/presentationml/2006/ole">
             <mc:AlternateContent xmlns:mc="http://schemas.openxmlformats.org/markup-compatibility/2006">
               <mc:Choice xmlns:v="urn:schemas-microsoft-com:vml" Requires="v">
-                <p:oleObj spid="_x0000_s4240" name="Equation" r:id="rId25" imgW="114300" imgH="165100" progId="Equation.3">
+                <p:oleObj spid="_x0000_s4302" name="Equation" r:id="rId25" imgW="114300" imgH="165100" progId="Equation.3">
                   <p:embed/>
                 </p:oleObj>
               </mc:Choice>
@@ -17690,7 +20408,7 @@
           <a:graphicData uri="http://schemas.openxmlformats.org/presentationml/2006/ole">
             <mc:AlternateContent xmlns:mc="http://schemas.openxmlformats.org/markup-compatibility/2006">
               <mc:Choice xmlns:v="urn:schemas-microsoft-com:vml" Requires="v">
-                <p:oleObj spid="_x0000_s6171" name="Equation" r:id="rId3" imgW="139700" imgH="228600" progId="Equation.3">
+                <p:oleObj spid="_x0000_s6198" name="Equation" r:id="rId3" imgW="139700" imgH="228600" progId="Equation.3">
                   <p:embed/>
                 </p:oleObj>
               </mc:Choice>
@@ -17749,7 +20467,7 @@
           <a:graphicData uri="http://schemas.openxmlformats.org/presentationml/2006/ole">
             <mc:AlternateContent xmlns:mc="http://schemas.openxmlformats.org/markup-compatibility/2006">
               <mc:Choice xmlns:v="urn:schemas-microsoft-com:vml" Requires="v">
-                <p:oleObj spid="_x0000_s6172" name="Equation" r:id="rId5" imgW="165100" imgH="228600" progId="Equation.3">
+                <p:oleObj spid="_x0000_s6199" name="Equation" r:id="rId5" imgW="165100" imgH="228600" progId="Equation.3">
                   <p:embed/>
                 </p:oleObj>
               </mc:Choice>
@@ -17843,7 +20561,7 @@
           <a:graphicData uri="http://schemas.openxmlformats.org/presentationml/2006/ole">
             <mc:AlternateContent xmlns:mc="http://schemas.openxmlformats.org/markup-compatibility/2006">
               <mc:Choice xmlns:v="urn:schemas-microsoft-com:vml" Requires="v">
-                <p:oleObj spid="_x0000_s6173" name="Equation" r:id="rId7" imgW="165100" imgH="241300" progId="Equation.3">
+                <p:oleObj spid="_x0000_s6200" name="Equation" r:id="rId7" imgW="165100" imgH="241300" progId="Equation.3">
                   <p:embed/>
                 </p:oleObj>
               </mc:Choice>
@@ -17902,7 +20620,7 @@
           <a:graphicData uri="http://schemas.openxmlformats.org/presentationml/2006/ole">
             <mc:AlternateContent xmlns:mc="http://schemas.openxmlformats.org/markup-compatibility/2006">
               <mc:Choice xmlns:v="urn:schemas-microsoft-com:vml" Requires="v">
-                <p:oleObj spid="_x0000_s6174" name="Equation" r:id="rId9" imgW="165100" imgH="254000" progId="Equation.3">
+                <p:oleObj spid="_x0000_s6201" name="Equation" r:id="rId9" imgW="165100" imgH="254000" progId="Equation.3">
                   <p:embed/>
                 </p:oleObj>
               </mc:Choice>
@@ -17961,7 +20679,7 @@
           <a:graphicData uri="http://schemas.openxmlformats.org/presentationml/2006/ole">
             <mc:AlternateContent xmlns:mc="http://schemas.openxmlformats.org/markup-compatibility/2006">
               <mc:Choice xmlns:v="urn:schemas-microsoft-com:vml" Requires="v">
-                <p:oleObj spid="_x0000_s6175" name="Equation" r:id="rId11" imgW="165100" imgH="254000" progId="Equation.3">
+                <p:oleObj spid="_x0000_s6202" name="Equation" r:id="rId11" imgW="165100" imgH="254000" progId="Equation.3">
                   <p:embed/>
                 </p:oleObj>
               </mc:Choice>
@@ -21163,7 +23881,7 @@
           <a:graphicData uri="http://schemas.openxmlformats.org/presentationml/2006/ole">
             <mc:AlternateContent xmlns:mc="http://schemas.openxmlformats.org/markup-compatibility/2006">
               <mc:Choice xmlns:v="urn:schemas-microsoft-com:vml" Requires="v">
-                <p:oleObj spid="_x0000_s7205" name="Equation" r:id="rId3" imgW="165100" imgH="228600" progId="Equation.3">
+                <p:oleObj spid="_x0000_s7237" name="Equation" r:id="rId3" imgW="165100" imgH="228600" progId="Equation.3">
                   <p:embed/>
                 </p:oleObj>
               </mc:Choice>
@@ -21222,7 +23940,7 @@
           <a:graphicData uri="http://schemas.openxmlformats.org/presentationml/2006/ole">
             <mc:AlternateContent xmlns:mc="http://schemas.openxmlformats.org/markup-compatibility/2006">
               <mc:Choice xmlns:v="urn:schemas-microsoft-com:vml" Requires="v">
-                <p:oleObj spid="_x0000_s7206" name="Equation" r:id="rId5" imgW="165100" imgH="228600" progId="Equation.3">
+                <p:oleObj spid="_x0000_s7238" name="Equation" r:id="rId5" imgW="165100" imgH="228600" progId="Equation.3">
                   <p:embed/>
                 </p:oleObj>
               </mc:Choice>
@@ -21281,7 +23999,7 @@
           <a:graphicData uri="http://schemas.openxmlformats.org/presentationml/2006/ole">
             <mc:AlternateContent xmlns:mc="http://schemas.openxmlformats.org/markup-compatibility/2006">
               <mc:Choice xmlns:v="urn:schemas-microsoft-com:vml" Requires="v">
-                <p:oleObj spid="_x0000_s7207" name="Equation" r:id="rId7" imgW="190500" imgH="228600" progId="Equation.3">
+                <p:oleObj spid="_x0000_s7239" name="Equation" r:id="rId7" imgW="190500" imgH="228600" progId="Equation.3">
                   <p:embed/>
                 </p:oleObj>
               </mc:Choice>
@@ -21340,7 +24058,7 @@
           <a:graphicData uri="http://schemas.openxmlformats.org/presentationml/2006/ole">
             <mc:AlternateContent xmlns:mc="http://schemas.openxmlformats.org/markup-compatibility/2006">
               <mc:Choice xmlns:v="urn:schemas-microsoft-com:vml" Requires="v">
-                <p:oleObj spid="_x0000_s7208" name="Equation" r:id="rId9" imgW="165100" imgH="228600" progId="Equation.3">
+                <p:oleObj spid="_x0000_s7240" name="Equation" r:id="rId9" imgW="165100" imgH="228600" progId="Equation.3">
                   <p:embed/>
                 </p:oleObj>
               </mc:Choice>
@@ -21399,7 +24117,7 @@
           <a:graphicData uri="http://schemas.openxmlformats.org/presentationml/2006/ole">
             <mc:AlternateContent xmlns:mc="http://schemas.openxmlformats.org/markup-compatibility/2006">
               <mc:Choice xmlns:v="urn:schemas-microsoft-com:vml" Requires="v">
-                <p:oleObj spid="_x0000_s7209" name="Equation" r:id="rId11" imgW="165100" imgH="228600" progId="Equation.3">
+                <p:oleObj spid="_x0000_s7241" name="Equation" r:id="rId11" imgW="165100" imgH="228600" progId="Equation.3">
                   <p:embed/>
                 </p:oleObj>
               </mc:Choice>
@@ -21458,7 +24176,7 @@
           <a:graphicData uri="http://schemas.openxmlformats.org/presentationml/2006/ole">
             <mc:AlternateContent xmlns:mc="http://schemas.openxmlformats.org/markup-compatibility/2006">
               <mc:Choice xmlns:v="urn:schemas-microsoft-com:vml" Requires="v">
-                <p:oleObj spid="_x0000_s7210" name="Equation" r:id="rId13" imgW="177800" imgH="228600" progId="Equation.3">
+                <p:oleObj spid="_x0000_s7242" name="Equation" r:id="rId13" imgW="177800" imgH="228600" progId="Equation.3">
                   <p:embed/>
                 </p:oleObj>
               </mc:Choice>
@@ -21607,7 +24325,7 @@
           <a:graphicData uri="http://schemas.openxmlformats.org/presentationml/2006/ole">
             <mc:AlternateContent xmlns:mc="http://schemas.openxmlformats.org/markup-compatibility/2006">
               <mc:Choice xmlns:v="urn:schemas-microsoft-com:vml" Requires="v">
-                <p:oleObj spid="_x0000_s8207" name="Equation" r:id="rId6" imgW="165100" imgH="228600" progId="Equation.3">
+                <p:oleObj spid="_x0000_s8239" name="Equation" r:id="rId6" imgW="165100" imgH="228600" progId="Equation.3">
                   <p:embed/>
                 </p:oleObj>
               </mc:Choice>
@@ -21666,7 +24384,7 @@
           <a:graphicData uri="http://schemas.openxmlformats.org/presentationml/2006/ole">
             <mc:AlternateContent xmlns:mc="http://schemas.openxmlformats.org/markup-compatibility/2006">
               <mc:Choice xmlns:v="urn:schemas-microsoft-com:vml" Requires="v">
-                <p:oleObj spid="_x0000_s8208" name="Equation" r:id="rId8" imgW="165100" imgH="228600" progId="Equation.3">
+                <p:oleObj spid="_x0000_s8240" name="Equation" r:id="rId8" imgW="165100" imgH="228600" progId="Equation.3">
                   <p:embed/>
                 </p:oleObj>
               </mc:Choice>
@@ -21725,7 +24443,7 @@
           <a:graphicData uri="http://schemas.openxmlformats.org/presentationml/2006/ole">
             <mc:AlternateContent xmlns:mc="http://schemas.openxmlformats.org/markup-compatibility/2006">
               <mc:Choice xmlns:v="urn:schemas-microsoft-com:vml" Requires="v">
-                <p:oleObj spid="_x0000_s8209" name="Equation" r:id="rId10" imgW="101600" imgH="152400" progId="Equation.3">
+                <p:oleObj spid="_x0000_s8241" name="Equation" r:id="rId10" imgW="101600" imgH="152400" progId="Equation.3">
                   <p:embed/>
                 </p:oleObj>
               </mc:Choice>
@@ -21784,7 +24502,7 @@
           <a:graphicData uri="http://schemas.openxmlformats.org/presentationml/2006/ole">
             <mc:AlternateContent xmlns:mc="http://schemas.openxmlformats.org/markup-compatibility/2006">
               <mc:Choice xmlns:v="urn:schemas-microsoft-com:vml" Requires="v">
-                <p:oleObj spid="_x0000_s8210" name="Equation" r:id="rId12" imgW="101600" imgH="152400" progId="Equation.3">
+                <p:oleObj spid="_x0000_s8242" name="Equation" r:id="rId12" imgW="101600" imgH="152400" progId="Equation.3">
                   <p:embed/>
                 </p:oleObj>
               </mc:Choice>
@@ -21873,7 +24591,7 @@
           <a:graphicData uri="http://schemas.openxmlformats.org/presentationml/2006/ole">
             <mc:AlternateContent xmlns:mc="http://schemas.openxmlformats.org/markup-compatibility/2006">
               <mc:Choice xmlns:v="urn:schemas-microsoft-com:vml" Requires="v">
-                <p:oleObj spid="_x0000_s8211" name="Equation" r:id="rId14" imgW="101600" imgH="152400" progId="Equation.3">
+                <p:oleObj spid="_x0000_s8243" name="Equation" r:id="rId14" imgW="101600" imgH="152400" progId="Equation.3">
                   <p:embed/>
                 </p:oleObj>
               </mc:Choice>
@@ -21932,7 +24650,7 @@
           <a:graphicData uri="http://schemas.openxmlformats.org/presentationml/2006/ole">
             <mc:AlternateContent xmlns:mc="http://schemas.openxmlformats.org/markup-compatibility/2006">
               <mc:Choice xmlns:v="urn:schemas-microsoft-com:vml" Requires="v">
-                <p:oleObj spid="_x0000_s8212" name="Equation" r:id="rId15" imgW="165100" imgH="228600" progId="Equation.3">
+                <p:oleObj spid="_x0000_s8244" name="Equation" r:id="rId15" imgW="165100" imgH="228600" progId="Equation.3">
                   <p:embed/>
                 </p:oleObj>
               </mc:Choice>

</xml_diff>